<commit_message>
account event updates, cfct template update
</commit_message>
<xml_diff>
--- a/aws_sra_examples/solutions/account/account_alternate_contacts/documentation/account-alternate-contacts.pptx
+++ b/aws_sra_examples/solutions/account/account_alternate_contacts/documentation/account-alternate-contacts.pptx
@@ -197,7 +197,7 @@
           <a:p>
             <a:fld id="{FD8D84E3-00BA-4A46-8256-7E527D8B4480}" type="datetimeFigureOut">
               <a:rPr lang="en-US" smtClean="0"/>
-              <a:t>4/21/22</a:t>
+              <a:t>5/13/22</a:t>
             </a:fld>
             <a:endParaRPr lang="en-US"/>
           </a:p>
@@ -695,7 +695,7 @@
           <a:p>
             <a:fld id="{9FE185F7-9B28-9F45-9F43-9CB5A0B99390}" type="datetimeFigureOut">
               <a:rPr lang="en-US" smtClean="0"/>
-              <a:t>4/21/22</a:t>
+              <a:t>5/13/22</a:t>
             </a:fld>
             <a:endParaRPr lang="en-US"/>
           </a:p>
@@ -893,7 +893,7 @@
           <a:p>
             <a:fld id="{9FE185F7-9B28-9F45-9F43-9CB5A0B99390}" type="datetimeFigureOut">
               <a:rPr lang="en-US" smtClean="0"/>
-              <a:t>4/21/22</a:t>
+              <a:t>5/13/22</a:t>
             </a:fld>
             <a:endParaRPr lang="en-US"/>
           </a:p>
@@ -1101,7 +1101,7 @@
           <a:p>
             <a:fld id="{9FE185F7-9B28-9F45-9F43-9CB5A0B99390}" type="datetimeFigureOut">
               <a:rPr lang="en-US" smtClean="0"/>
-              <a:t>4/21/22</a:t>
+              <a:t>5/13/22</a:t>
             </a:fld>
             <a:endParaRPr lang="en-US"/>
           </a:p>
@@ -1299,7 +1299,7 @@
           <a:p>
             <a:fld id="{9FE185F7-9B28-9F45-9F43-9CB5A0B99390}" type="datetimeFigureOut">
               <a:rPr lang="en-US" smtClean="0"/>
-              <a:t>4/21/22</a:t>
+              <a:t>5/13/22</a:t>
             </a:fld>
             <a:endParaRPr lang="en-US"/>
           </a:p>
@@ -1574,7 +1574,7 @@
           <a:p>
             <a:fld id="{9FE185F7-9B28-9F45-9F43-9CB5A0B99390}" type="datetimeFigureOut">
               <a:rPr lang="en-US" smtClean="0"/>
-              <a:t>4/21/22</a:t>
+              <a:t>5/13/22</a:t>
             </a:fld>
             <a:endParaRPr lang="en-US"/>
           </a:p>
@@ -1839,7 +1839,7 @@
           <a:p>
             <a:fld id="{9FE185F7-9B28-9F45-9F43-9CB5A0B99390}" type="datetimeFigureOut">
               <a:rPr lang="en-US" smtClean="0"/>
-              <a:t>4/21/22</a:t>
+              <a:t>5/13/22</a:t>
             </a:fld>
             <a:endParaRPr lang="en-US"/>
           </a:p>
@@ -2251,7 +2251,7 @@
           <a:p>
             <a:fld id="{9FE185F7-9B28-9F45-9F43-9CB5A0B99390}" type="datetimeFigureOut">
               <a:rPr lang="en-US" smtClean="0"/>
-              <a:t>4/21/22</a:t>
+              <a:t>5/13/22</a:t>
             </a:fld>
             <a:endParaRPr lang="en-US"/>
           </a:p>
@@ -2392,7 +2392,7 @@
           <a:p>
             <a:fld id="{9FE185F7-9B28-9F45-9F43-9CB5A0B99390}" type="datetimeFigureOut">
               <a:rPr lang="en-US" smtClean="0"/>
-              <a:t>4/21/22</a:t>
+              <a:t>5/13/22</a:t>
             </a:fld>
             <a:endParaRPr lang="en-US"/>
           </a:p>
@@ -2505,7 +2505,7 @@
           <a:p>
             <a:fld id="{9FE185F7-9B28-9F45-9F43-9CB5A0B99390}" type="datetimeFigureOut">
               <a:rPr lang="en-US" smtClean="0"/>
-              <a:t>4/21/22</a:t>
+              <a:t>5/13/22</a:t>
             </a:fld>
             <a:endParaRPr lang="en-US"/>
           </a:p>
@@ -2816,7 +2816,7 @@
           <a:p>
             <a:fld id="{9FE185F7-9B28-9F45-9F43-9CB5A0B99390}" type="datetimeFigureOut">
               <a:rPr lang="en-US" smtClean="0"/>
-              <a:t>4/21/22</a:t>
+              <a:t>5/13/22</a:t>
             </a:fld>
             <a:endParaRPr lang="en-US"/>
           </a:p>
@@ -3104,7 +3104,7 @@
           <a:p>
             <a:fld id="{9FE185F7-9B28-9F45-9F43-9CB5A0B99390}" type="datetimeFigureOut">
               <a:rPr lang="en-US" smtClean="0"/>
-              <a:t>4/21/22</a:t>
+              <a:t>5/13/22</a:t>
             </a:fld>
             <a:endParaRPr lang="en-US"/>
           </a:p>
@@ -3345,7 +3345,7 @@
           <a:p>
             <a:fld id="{9FE185F7-9B28-9F45-9F43-9CB5A0B99390}" type="datetimeFigureOut">
               <a:rPr lang="en-US" smtClean="0"/>
-              <a:t>4/21/22</a:t>
+              <a:t>5/13/22</a:t>
             </a:fld>
             <a:endParaRPr lang="en-US"/>
           </a:p>
@@ -3748,6 +3748,17 @@
 <file path=ppt/slides/slide1.xml><?xml version="1.0" encoding="utf-8"?>
 <p:sld xmlns:a="http://schemas.openxmlformats.org/drawingml/2006/main" xmlns:r="http://schemas.openxmlformats.org/officeDocument/2006/relationships" xmlns:p="http://schemas.openxmlformats.org/presentationml/2006/main">
   <p:cSld>
+    <p:bg>
+      <p:bgPr>
+        <a:solidFill>
+          <a:schemeClr val="tx1">
+            <a:lumMod val="75000"/>
+            <a:lumOff val="25000"/>
+          </a:schemeClr>
+        </a:solidFill>
+        <a:effectLst/>
+      </p:bgPr>
+    </p:bg>
     <p:spTree>
       <p:nvGrpSpPr>
         <p:cNvPr id="1" name=""/>

</xml_diff>

<commit_message>
updating parameters per request
</commit_message>
<xml_diff>
--- a/aws_sra_examples/solutions/account/account_alternate_contacts/documentation/account-alternate-contacts.pptx
+++ b/aws_sra_examples/solutions/account/account_alternate_contacts/documentation/account-alternate-contacts.pptx
@@ -5,10 +5,11 @@
     <p:sldMasterId id="2147483648" r:id="rId1"/>
   </p:sldMasterIdLst>
   <p:notesMasterIdLst>
-    <p:notesMasterId r:id="rId3"/>
+    <p:notesMasterId r:id="rId4"/>
   </p:notesMasterIdLst>
   <p:sldIdLst>
     <p:sldId id="256" r:id="rId2"/>
+    <p:sldId id="257" r:id="rId3"/>
   </p:sldIdLst>
   <p:sldSz cx="12192000" cy="6858000"/>
   <p:notesSz cx="6858000" cy="9144000"/>
@@ -197,7 +198,7 @@
           <a:p>
             <a:fld id="{FD8D84E3-00BA-4A46-8256-7E527D8B4480}" type="datetimeFigureOut">
               <a:rPr lang="en-US" smtClean="0"/>
-              <a:t>5/13/22</a:t>
+              <a:t>9/14/2023</a:t>
             </a:fld>
             <a:endParaRPr lang="en-US"/>
           </a:p>
@@ -548,6 +549,90 @@
 </p:notes>
 </file>
 
+<file path=ppt/notesSlides/notesSlide2.xml><?xml version="1.0" encoding="utf-8"?>
+<p:notes xmlns:a="http://schemas.openxmlformats.org/drawingml/2006/main" xmlns:r="http://schemas.openxmlformats.org/officeDocument/2006/relationships" xmlns:p="http://schemas.openxmlformats.org/presentationml/2006/main">
+  <p:cSld>
+    <p:spTree>
+      <p:nvGrpSpPr>
+        <p:cNvPr id="1" name=""/>
+        <p:cNvGrpSpPr/>
+        <p:nvPr/>
+      </p:nvGrpSpPr>
+      <p:grpSpPr>
+        <a:xfrm>
+          <a:off x="0" y="0"/>
+          <a:ext cx="0" cy="0"/>
+          <a:chOff x="0" y="0"/>
+          <a:chExt cx="0" cy="0"/>
+        </a:xfrm>
+      </p:grpSpPr>
+      <p:sp>
+        <p:nvSpPr>
+          <p:cNvPr id="2" name="Slide Image Placeholder 1"/>
+          <p:cNvSpPr>
+            <a:spLocks noGrp="1" noRot="1" noChangeAspect="1"/>
+          </p:cNvSpPr>
+          <p:nvPr>
+            <p:ph type="sldImg"/>
+          </p:nvPr>
+        </p:nvSpPr>
+        <p:spPr/>
+      </p:sp>
+      <p:sp>
+        <p:nvSpPr>
+          <p:cNvPr id="3" name="Notes Placeholder 2"/>
+          <p:cNvSpPr>
+            <a:spLocks noGrp="1"/>
+          </p:cNvSpPr>
+          <p:nvPr>
+            <p:ph type="body" idx="1"/>
+          </p:nvPr>
+        </p:nvSpPr>
+        <p:spPr/>
+        <p:txBody>
+          <a:bodyPr/>
+          <a:lstStyle/>
+          <a:p>
+            <a:endParaRPr lang="en-US" dirty="0"/>
+          </a:p>
+        </p:txBody>
+      </p:sp>
+      <p:sp>
+        <p:nvSpPr>
+          <p:cNvPr id="4" name="Slide Number Placeholder 3"/>
+          <p:cNvSpPr>
+            <a:spLocks noGrp="1"/>
+          </p:cNvSpPr>
+          <p:nvPr>
+            <p:ph type="sldNum" sz="quarter" idx="5"/>
+          </p:nvPr>
+        </p:nvSpPr>
+        <p:spPr/>
+        <p:txBody>
+          <a:bodyPr/>
+          <a:lstStyle/>
+          <a:p>
+            <a:fld id="{9E1330C4-BBBB-FC4A-85DD-6AFA452BF0C0}" type="slidenum">
+              <a:rPr lang="en-US" smtClean="0"/>
+              <a:t>2</a:t>
+            </a:fld>
+            <a:endParaRPr lang="en-US"/>
+          </a:p>
+        </p:txBody>
+      </p:sp>
+    </p:spTree>
+    <p:extLst>
+      <p:ext uri="{BB962C8B-B14F-4D97-AF65-F5344CB8AC3E}">
+        <p14:creationId xmlns:p14="http://schemas.microsoft.com/office/powerpoint/2010/main" val="1833991399"/>
+      </p:ext>
+    </p:extLst>
+  </p:cSld>
+  <p:clrMapOvr>
+    <a:masterClrMapping/>
+  </p:clrMapOvr>
+</p:notes>
+</file>
+
 <file path=ppt/slideLayouts/slideLayout1.xml><?xml version="1.0" encoding="utf-8"?>
 <p:sldLayout xmlns:a="http://schemas.openxmlformats.org/drawingml/2006/main" xmlns:r="http://schemas.openxmlformats.org/officeDocument/2006/relationships" xmlns:p="http://schemas.openxmlformats.org/presentationml/2006/main" type="title" preserve="1">
   <p:cSld name="Title Slide">
@@ -695,7 +780,7 @@
           <a:p>
             <a:fld id="{9FE185F7-9B28-9F45-9F43-9CB5A0B99390}" type="datetimeFigureOut">
               <a:rPr lang="en-US" smtClean="0"/>
-              <a:t>5/13/22</a:t>
+              <a:t>9/14/2023</a:t>
             </a:fld>
             <a:endParaRPr lang="en-US"/>
           </a:p>
@@ -893,7 +978,7 @@
           <a:p>
             <a:fld id="{9FE185F7-9B28-9F45-9F43-9CB5A0B99390}" type="datetimeFigureOut">
               <a:rPr lang="en-US" smtClean="0"/>
-              <a:t>5/13/22</a:t>
+              <a:t>9/14/2023</a:t>
             </a:fld>
             <a:endParaRPr lang="en-US"/>
           </a:p>
@@ -1101,7 +1186,7 @@
           <a:p>
             <a:fld id="{9FE185F7-9B28-9F45-9F43-9CB5A0B99390}" type="datetimeFigureOut">
               <a:rPr lang="en-US" smtClean="0"/>
-              <a:t>5/13/22</a:t>
+              <a:t>9/14/2023</a:t>
             </a:fld>
             <a:endParaRPr lang="en-US"/>
           </a:p>
@@ -1299,7 +1384,7 @@
           <a:p>
             <a:fld id="{9FE185F7-9B28-9F45-9F43-9CB5A0B99390}" type="datetimeFigureOut">
               <a:rPr lang="en-US" smtClean="0"/>
-              <a:t>5/13/22</a:t>
+              <a:t>9/14/2023</a:t>
             </a:fld>
             <a:endParaRPr lang="en-US"/>
           </a:p>
@@ -1574,7 +1659,7 @@
           <a:p>
             <a:fld id="{9FE185F7-9B28-9F45-9F43-9CB5A0B99390}" type="datetimeFigureOut">
               <a:rPr lang="en-US" smtClean="0"/>
-              <a:t>5/13/22</a:t>
+              <a:t>9/14/2023</a:t>
             </a:fld>
             <a:endParaRPr lang="en-US"/>
           </a:p>
@@ -1839,7 +1924,7 @@
           <a:p>
             <a:fld id="{9FE185F7-9B28-9F45-9F43-9CB5A0B99390}" type="datetimeFigureOut">
               <a:rPr lang="en-US" smtClean="0"/>
-              <a:t>5/13/22</a:t>
+              <a:t>9/14/2023</a:t>
             </a:fld>
             <a:endParaRPr lang="en-US"/>
           </a:p>
@@ -2251,7 +2336,7 @@
           <a:p>
             <a:fld id="{9FE185F7-9B28-9F45-9F43-9CB5A0B99390}" type="datetimeFigureOut">
               <a:rPr lang="en-US" smtClean="0"/>
-              <a:t>5/13/22</a:t>
+              <a:t>9/14/2023</a:t>
             </a:fld>
             <a:endParaRPr lang="en-US"/>
           </a:p>
@@ -2392,7 +2477,7 @@
           <a:p>
             <a:fld id="{9FE185F7-9B28-9F45-9F43-9CB5A0B99390}" type="datetimeFigureOut">
               <a:rPr lang="en-US" smtClean="0"/>
-              <a:t>5/13/22</a:t>
+              <a:t>9/14/2023</a:t>
             </a:fld>
             <a:endParaRPr lang="en-US"/>
           </a:p>
@@ -2505,7 +2590,7 @@
           <a:p>
             <a:fld id="{9FE185F7-9B28-9F45-9F43-9CB5A0B99390}" type="datetimeFigureOut">
               <a:rPr lang="en-US" smtClean="0"/>
-              <a:t>5/13/22</a:t>
+              <a:t>9/14/2023</a:t>
             </a:fld>
             <a:endParaRPr lang="en-US"/>
           </a:p>
@@ -2816,7 +2901,7 @@
           <a:p>
             <a:fld id="{9FE185F7-9B28-9F45-9F43-9CB5A0B99390}" type="datetimeFigureOut">
               <a:rPr lang="en-US" smtClean="0"/>
-              <a:t>5/13/22</a:t>
+              <a:t>9/14/2023</a:t>
             </a:fld>
             <a:endParaRPr lang="en-US"/>
           </a:p>
@@ -3104,7 +3189,7 @@
           <a:p>
             <a:fld id="{9FE185F7-9B28-9F45-9F43-9CB5A0B99390}" type="datetimeFigureOut">
               <a:rPr lang="en-US" smtClean="0"/>
-              <a:t>5/13/22</a:t>
+              <a:t>9/14/2023</a:t>
             </a:fld>
             <a:endParaRPr lang="en-US"/>
           </a:p>
@@ -3345,7 +3430,7 @@
           <a:p>
             <a:fld id="{9FE185F7-9B28-9F45-9F43-9CB5A0B99390}" type="datetimeFigureOut">
               <a:rPr lang="en-US" smtClean="0"/>
-              <a:t>5/13/22</a:t>
+              <a:t>9/14/2023</a:t>
             </a:fld>
             <a:endParaRPr lang="en-US"/>
           </a:p>
@@ -7813,6 +7898,4083 @@
     <p:extLst>
       <p:ext uri="{BB962C8B-B14F-4D97-AF65-F5344CB8AC3E}">
         <p14:creationId xmlns:p14="http://schemas.microsoft.com/office/powerpoint/2010/main" val="2296993975"/>
+      </p:ext>
+    </p:extLst>
+  </p:cSld>
+  <p:clrMapOvr>
+    <a:masterClrMapping/>
+  </p:clrMapOvr>
+</p:sld>
+</file>
+
+<file path=ppt/slides/slide2.xml><?xml version="1.0" encoding="utf-8"?>
+<p:sld xmlns:a="http://schemas.openxmlformats.org/drawingml/2006/main" xmlns:r="http://schemas.openxmlformats.org/officeDocument/2006/relationships" xmlns:p="http://schemas.openxmlformats.org/presentationml/2006/main">
+  <p:cSld>
+    <p:bg>
+      <p:bgPr>
+        <a:solidFill>
+          <a:schemeClr val="tx1">
+            <a:lumMod val="75000"/>
+            <a:lumOff val="25000"/>
+          </a:schemeClr>
+        </a:solidFill>
+        <a:effectLst/>
+      </p:bgPr>
+    </p:bg>
+    <p:spTree>
+      <p:nvGrpSpPr>
+        <p:cNvPr id="1" name=""/>
+        <p:cNvGrpSpPr/>
+        <p:nvPr/>
+      </p:nvGrpSpPr>
+      <p:grpSpPr>
+        <a:xfrm>
+          <a:off x="0" y="0"/>
+          <a:ext cx="0" cy="0"/>
+          <a:chOff x="0" y="0"/>
+          <a:chExt cx="0" cy="0"/>
+        </a:xfrm>
+      </p:grpSpPr>
+      <p:sp>
+        <p:nvSpPr>
+          <p:cNvPr id="158" name="Rectangle 157">
+            <a:extLst>
+              <a:ext uri="{FF2B5EF4-FFF2-40B4-BE49-F238E27FC236}">
+                <a16:creationId xmlns:a16="http://schemas.microsoft.com/office/drawing/2014/main" id="{39940720-0CF8-DE48-BF8F-A16B7DD2A14B}"/>
+              </a:ext>
+            </a:extLst>
+          </p:cNvPr>
+          <p:cNvSpPr/>
+          <p:nvPr/>
+        </p:nvSpPr>
+        <p:spPr>
+          <a:xfrm>
+            <a:off x="874189" y="355082"/>
+            <a:ext cx="10443621" cy="5615510"/>
+          </a:xfrm>
+          <a:prstGeom prst="rect">
+            <a:avLst/>
+          </a:prstGeom>
+          <a:solidFill>
+            <a:schemeClr val="bg1"/>
+          </a:solidFill>
+          <a:ln w="12700">
+            <a:solidFill>
+              <a:schemeClr val="tx1"/>
+            </a:solidFill>
+          </a:ln>
+        </p:spPr>
+        <p:style>
+          <a:lnRef idx="2">
+            <a:schemeClr val="accent1">
+              <a:shade val="50000"/>
+            </a:schemeClr>
+          </a:lnRef>
+          <a:fillRef idx="1">
+            <a:schemeClr val="accent1"/>
+          </a:fillRef>
+          <a:effectRef idx="0">
+            <a:schemeClr val="accent1"/>
+          </a:effectRef>
+          <a:fontRef idx="minor">
+            <a:schemeClr val="lt1"/>
+          </a:fontRef>
+        </p:style>
+        <p:txBody>
+          <a:bodyPr rot="0" spcFirstLastPara="0" vert="horz" wrap="square" lIns="457200" tIns="91440" rIns="91440" bIns="45720" numCol="1" spcCol="0" rtlCol="0" fromWordArt="0" anchor="t" anchorCtr="0" forceAA="0" compatLnSpc="1">
+            <a:prstTxWarp prst="textNoShape">
+              <a:avLst/>
+            </a:prstTxWarp>
+            <a:noAutofit/>
+          </a:bodyPr>
+          <a:lstStyle>
+            <a:lvl1pPr>
+              <a:defRPr>
+                <a:solidFill>
+                  <a:schemeClr val="lt1"/>
+                </a:solidFill>
+                <a:latin typeface="+mn-lt"/>
+                <a:ea typeface="+mn-ea"/>
+                <a:cs typeface="+mn-cs"/>
+              </a:defRPr>
+            </a:lvl1pPr>
+            <a:lvl2pPr>
+              <a:defRPr>
+                <a:solidFill>
+                  <a:schemeClr val="lt1"/>
+                </a:solidFill>
+                <a:latin typeface="+mn-lt"/>
+                <a:ea typeface="+mn-ea"/>
+                <a:cs typeface="+mn-cs"/>
+              </a:defRPr>
+            </a:lvl2pPr>
+            <a:lvl3pPr>
+              <a:defRPr>
+                <a:solidFill>
+                  <a:schemeClr val="lt1"/>
+                </a:solidFill>
+                <a:latin typeface="+mn-lt"/>
+                <a:ea typeface="+mn-ea"/>
+                <a:cs typeface="+mn-cs"/>
+              </a:defRPr>
+            </a:lvl3pPr>
+            <a:lvl4pPr>
+              <a:defRPr>
+                <a:solidFill>
+                  <a:schemeClr val="lt1"/>
+                </a:solidFill>
+                <a:latin typeface="+mn-lt"/>
+                <a:ea typeface="+mn-ea"/>
+                <a:cs typeface="+mn-cs"/>
+              </a:defRPr>
+            </a:lvl4pPr>
+            <a:lvl5pPr>
+              <a:defRPr>
+                <a:solidFill>
+                  <a:schemeClr val="lt1"/>
+                </a:solidFill>
+                <a:latin typeface="+mn-lt"/>
+                <a:ea typeface="+mn-ea"/>
+                <a:cs typeface="+mn-cs"/>
+              </a:defRPr>
+            </a:lvl5pPr>
+            <a:lvl6pPr>
+              <a:defRPr>
+                <a:solidFill>
+                  <a:schemeClr val="lt1"/>
+                </a:solidFill>
+                <a:latin typeface="+mn-lt"/>
+                <a:ea typeface="+mn-ea"/>
+                <a:cs typeface="+mn-cs"/>
+              </a:defRPr>
+            </a:lvl6pPr>
+            <a:lvl7pPr>
+              <a:defRPr>
+                <a:solidFill>
+                  <a:schemeClr val="lt1"/>
+                </a:solidFill>
+                <a:latin typeface="+mn-lt"/>
+                <a:ea typeface="+mn-ea"/>
+                <a:cs typeface="+mn-cs"/>
+              </a:defRPr>
+            </a:lvl7pPr>
+            <a:lvl8pPr>
+              <a:defRPr>
+                <a:solidFill>
+                  <a:schemeClr val="lt1"/>
+                </a:solidFill>
+                <a:latin typeface="+mn-lt"/>
+                <a:ea typeface="+mn-ea"/>
+                <a:cs typeface="+mn-cs"/>
+              </a:defRPr>
+            </a:lvl8pPr>
+            <a:lvl9pPr>
+              <a:defRPr>
+                <a:solidFill>
+                  <a:schemeClr val="lt1"/>
+                </a:solidFill>
+                <a:latin typeface="+mn-lt"/>
+                <a:ea typeface="+mn-ea"/>
+                <a:cs typeface="+mn-cs"/>
+              </a:defRPr>
+            </a:lvl9pPr>
+          </a:lstStyle>
+          <a:p>
+            <a:pPr algn="l"/>
+            <a:r>
+              <a:rPr lang="en-US" sz="1400" dirty="0">
+                <a:solidFill>
+                  <a:sysClr val="windowText" lastClr="000000"/>
+                </a:solidFill>
+                <a:latin typeface="Arial" panose="020B0604020202020204" pitchFamily="34" charset="0"/>
+                <a:cs typeface="Arial" panose="020B0604020202020204" pitchFamily="34" charset="0"/>
+              </a:rPr>
+              <a:t>AWS Cloud</a:t>
+            </a:r>
+          </a:p>
+        </p:txBody>
+      </p:sp>
+      <p:pic>
+        <p:nvPicPr>
+          <p:cNvPr id="126" name="Graphic 2">
+            <a:extLst>
+              <a:ext uri="{FF2B5EF4-FFF2-40B4-BE49-F238E27FC236}">
+                <a16:creationId xmlns:a16="http://schemas.microsoft.com/office/drawing/2014/main" id="{F04267D0-7955-2C4A-842B-D8A3A9599CC0}"/>
+              </a:ext>
+            </a:extLst>
+          </p:cNvPr>
+          <p:cNvPicPr>
+            <a:picLocks noChangeAspect="1"/>
+          </p:cNvPicPr>
+          <p:nvPr/>
+        </p:nvPicPr>
+        <p:blipFill>
+          <a:blip r:embed="rId3">
+            <a:extLst>
+              <a:ext uri="{96DAC541-7B7A-43D3-8B79-37D633B846F1}">
+                <asvg:svgBlip xmlns:asvg="http://schemas.microsoft.com/office/drawing/2016/SVG/main" r:embed="rId4"/>
+              </a:ext>
+            </a:extLst>
+          </a:blip>
+          <a:stretch>
+            <a:fillRect/>
+          </a:stretch>
+        </p:blipFill>
+        <p:spPr>
+          <a:xfrm>
+            <a:off x="874189" y="352492"/>
+            <a:ext cx="330200" cy="330200"/>
+          </a:xfrm>
+          <a:prstGeom prst="rect">
+            <a:avLst/>
+          </a:prstGeom>
+        </p:spPr>
+      </p:pic>
+      <p:sp>
+        <p:nvSpPr>
+          <p:cNvPr id="129" name="Rectangle 128">
+            <a:extLst>
+              <a:ext uri="{FF2B5EF4-FFF2-40B4-BE49-F238E27FC236}">
+                <a16:creationId xmlns:a16="http://schemas.microsoft.com/office/drawing/2014/main" id="{FB73AA4D-BE37-B546-8168-72555838077A}"/>
+              </a:ext>
+            </a:extLst>
+          </p:cNvPr>
+          <p:cNvSpPr/>
+          <p:nvPr/>
+        </p:nvSpPr>
+        <p:spPr>
+          <a:xfrm>
+            <a:off x="1010211" y="863417"/>
+            <a:ext cx="6561902" cy="4944716"/>
+          </a:xfrm>
+          <a:prstGeom prst="rect">
+            <a:avLst/>
+          </a:prstGeom>
+          <a:noFill/>
+          <a:ln w="12700">
+            <a:solidFill>
+              <a:schemeClr val="tx1"/>
+            </a:solidFill>
+            <a:prstDash val="solid"/>
+          </a:ln>
+        </p:spPr>
+        <p:style>
+          <a:lnRef idx="2">
+            <a:schemeClr val="accent1">
+              <a:shade val="50000"/>
+            </a:schemeClr>
+          </a:lnRef>
+          <a:fillRef idx="1">
+            <a:schemeClr val="accent1"/>
+          </a:fillRef>
+          <a:effectRef idx="0">
+            <a:schemeClr val="accent1"/>
+          </a:effectRef>
+          <a:fontRef idx="minor">
+            <a:schemeClr val="lt1"/>
+          </a:fontRef>
+        </p:style>
+        <p:txBody>
+          <a:bodyPr rot="0" spcFirstLastPara="0" vertOverflow="overflow" horzOverflow="overflow" vert="horz" wrap="square" lIns="91440" tIns="91440" rIns="91440" bIns="45720" numCol="1" spcCol="0" rtlCol="0" fromWordArt="0" anchor="t" anchorCtr="0" forceAA="0" compatLnSpc="1">
+            <a:prstTxWarp prst="textNoShape">
+              <a:avLst/>
+            </a:prstTxWarp>
+            <a:noAutofit/>
+          </a:bodyPr>
+          <a:lstStyle/>
+          <a:p>
+            <a:pPr algn="ctr"/>
+            <a:r>
+              <a:rPr lang="en-US" sz="1400" dirty="0">
+                <a:solidFill>
+                  <a:schemeClr val="tx1"/>
+                </a:solidFill>
+                <a:latin typeface="Arial" panose="020B0604020202020204" pitchFamily="34" charset="0"/>
+                <a:cs typeface="Arial" panose="020B0604020202020204" pitchFamily="34" charset="0"/>
+              </a:rPr>
+              <a:t>Organization Management Account</a:t>
+            </a:r>
+          </a:p>
+        </p:txBody>
+      </p:sp>
+      <p:sp>
+        <p:nvSpPr>
+          <p:cNvPr id="151" name="TextBox 150">
+            <a:extLst>
+              <a:ext uri="{FF2B5EF4-FFF2-40B4-BE49-F238E27FC236}">
+                <a16:creationId xmlns:a16="http://schemas.microsoft.com/office/drawing/2014/main" id="{08B67E83-7D09-C748-AEEF-49786315014A}"/>
+              </a:ext>
+            </a:extLst>
+          </p:cNvPr>
+          <p:cNvSpPr txBox="1"/>
+          <p:nvPr/>
+        </p:nvSpPr>
+        <p:spPr>
+          <a:xfrm>
+            <a:off x="1164680" y="1970937"/>
+            <a:ext cx="1240931" cy="430887"/>
+          </a:xfrm>
+          <a:prstGeom prst="rect">
+            <a:avLst/>
+          </a:prstGeom>
+          <a:noFill/>
+        </p:spPr>
+        <p:txBody>
+          <a:bodyPr wrap="square" rtlCol="0">
+            <a:spAutoFit/>
+          </a:bodyPr>
+          <a:lstStyle/>
+          <a:p>
+            <a:pPr algn="ctr"/>
+            <a:r>
+              <a:rPr lang="en-US" sz="1100" dirty="0">
+                <a:latin typeface="Arial" panose="020B0604020202020204" pitchFamily="34" charset="0"/>
+                <a:cs typeface="Arial" panose="020B0604020202020204" pitchFamily="34" charset="0"/>
+              </a:rPr>
+              <a:t>AWS CloudFormation</a:t>
+            </a:r>
+          </a:p>
+        </p:txBody>
+      </p:sp>
+      <p:pic>
+        <p:nvPicPr>
+          <p:cNvPr id="152" name="Graphic 151">
+            <a:extLst>
+              <a:ext uri="{FF2B5EF4-FFF2-40B4-BE49-F238E27FC236}">
+                <a16:creationId xmlns:a16="http://schemas.microsoft.com/office/drawing/2014/main" id="{399FFB55-9DC7-0642-93ED-51225281247C}"/>
+              </a:ext>
+            </a:extLst>
+          </p:cNvPr>
+          <p:cNvPicPr>
+            <a:picLocks noChangeAspect="1"/>
+          </p:cNvPicPr>
+          <p:nvPr/>
+        </p:nvPicPr>
+        <p:blipFill>
+          <a:blip r:embed="rId5">
+            <a:extLst>
+              <a:ext uri="{96DAC541-7B7A-43D3-8B79-37D633B846F1}">
+                <asvg:svgBlip xmlns:asvg="http://schemas.microsoft.com/office/drawing/2016/SVG/main" r:embed="rId6"/>
+              </a:ext>
+            </a:extLst>
+          </a:blip>
+          <a:stretch>
+            <a:fillRect/>
+          </a:stretch>
+        </p:blipFill>
+        <p:spPr>
+          <a:xfrm>
+            <a:off x="1556546" y="1506997"/>
+            <a:ext cx="457200" cy="457200"/>
+          </a:xfrm>
+          <a:prstGeom prst="rect">
+            <a:avLst/>
+          </a:prstGeom>
+        </p:spPr>
+      </p:pic>
+      <p:sp>
+        <p:nvSpPr>
+          <p:cNvPr id="153" name="Rectangle 152">
+            <a:extLst>
+              <a:ext uri="{FF2B5EF4-FFF2-40B4-BE49-F238E27FC236}">
+                <a16:creationId xmlns:a16="http://schemas.microsoft.com/office/drawing/2014/main" id="{CB91CC3D-9B41-4F4E-A36E-8EBAE5690590}"/>
+              </a:ext>
+            </a:extLst>
+          </p:cNvPr>
+          <p:cNvSpPr/>
+          <p:nvPr/>
+        </p:nvSpPr>
+        <p:spPr>
+          <a:xfrm>
+            <a:off x="1160091" y="1259150"/>
+            <a:ext cx="6238366" cy="3263355"/>
+          </a:xfrm>
+          <a:prstGeom prst="rect">
+            <a:avLst/>
+          </a:prstGeom>
+          <a:noFill/>
+          <a:ln w="12700">
+            <a:solidFill>
+              <a:schemeClr val="tx1"/>
+            </a:solidFill>
+            <a:prstDash val="dash"/>
+          </a:ln>
+        </p:spPr>
+        <p:style>
+          <a:lnRef idx="2">
+            <a:schemeClr val="accent1">
+              <a:shade val="50000"/>
+            </a:schemeClr>
+          </a:lnRef>
+          <a:fillRef idx="1">
+            <a:schemeClr val="accent1"/>
+          </a:fillRef>
+          <a:effectRef idx="0">
+            <a:schemeClr val="accent1"/>
+          </a:effectRef>
+          <a:fontRef idx="minor">
+            <a:schemeClr val="lt1"/>
+          </a:fontRef>
+        </p:style>
+        <p:txBody>
+          <a:bodyPr rot="0" spcFirstLastPara="0" vertOverflow="overflow" horzOverflow="overflow" vert="horz" wrap="square" lIns="91440" tIns="0" rIns="91440" bIns="45720" numCol="1" spcCol="0" rtlCol="0" fromWordArt="0" anchor="t" anchorCtr="0" forceAA="0" compatLnSpc="1">
+            <a:prstTxWarp prst="textNoShape">
+              <a:avLst/>
+            </a:prstTxWarp>
+            <a:noAutofit/>
+          </a:bodyPr>
+          <a:lstStyle/>
+          <a:p>
+            <a:r>
+              <a:rPr lang="en-US" sz="1200" b="1" dirty="0">
+                <a:solidFill>
+                  <a:schemeClr val="tx1"/>
+                </a:solidFill>
+              </a:rPr>
+              <a:t>Home-region</a:t>
+            </a:r>
+          </a:p>
+        </p:txBody>
+      </p:sp>
+      <p:sp>
+        <p:nvSpPr>
+          <p:cNvPr id="226" name="Oval 225">
+            <a:extLst>
+              <a:ext uri="{FF2B5EF4-FFF2-40B4-BE49-F238E27FC236}">
+                <a16:creationId xmlns:a16="http://schemas.microsoft.com/office/drawing/2014/main" id="{B075B0CF-8F6A-3947-BD02-50EB6DA85CEE}"/>
+              </a:ext>
+            </a:extLst>
+          </p:cNvPr>
+          <p:cNvSpPr/>
+          <p:nvPr/>
+        </p:nvSpPr>
+        <p:spPr>
+          <a:xfrm>
+            <a:off x="1031041" y="879975"/>
+            <a:ext cx="253435" cy="212902"/>
+          </a:xfrm>
+          <a:prstGeom prst="ellipse">
+            <a:avLst/>
+          </a:prstGeom>
+          <a:solidFill>
+            <a:schemeClr val="tx1"/>
+          </a:solidFill>
+          <a:ln>
+            <a:solidFill>
+              <a:schemeClr val="tx1"/>
+            </a:solidFill>
+          </a:ln>
+        </p:spPr>
+        <p:style>
+          <a:lnRef idx="2">
+            <a:schemeClr val="accent1">
+              <a:shade val="50000"/>
+            </a:schemeClr>
+          </a:lnRef>
+          <a:fillRef idx="1">
+            <a:schemeClr val="accent1"/>
+          </a:fillRef>
+          <a:effectRef idx="0">
+            <a:schemeClr val="accent1"/>
+          </a:effectRef>
+          <a:fontRef idx="minor">
+            <a:schemeClr val="lt1"/>
+          </a:fontRef>
+        </p:style>
+        <p:txBody>
+          <a:bodyPr lIns="0" tIns="0" rIns="0" bIns="0" rtlCol="0" anchor="ctr"/>
+          <a:lstStyle/>
+          <a:p>
+            <a:pPr algn="ctr"/>
+            <a:r>
+              <a:rPr lang="en-US" sz="800" dirty="0">
+                <a:latin typeface="Arial" panose="020B0604020202020204" pitchFamily="34" charset="0"/>
+                <a:cs typeface="Arial" panose="020B0604020202020204" pitchFamily="34" charset="0"/>
+              </a:rPr>
+              <a:t>1.0</a:t>
+            </a:r>
+          </a:p>
+        </p:txBody>
+      </p:sp>
+      <p:sp>
+        <p:nvSpPr>
+          <p:cNvPr id="227" name="Oval 226">
+            <a:extLst>
+              <a:ext uri="{FF2B5EF4-FFF2-40B4-BE49-F238E27FC236}">
+                <a16:creationId xmlns:a16="http://schemas.microsoft.com/office/drawing/2014/main" id="{F0D1735B-0005-B145-8C48-3E3934A1D64E}"/>
+              </a:ext>
+            </a:extLst>
+          </p:cNvPr>
+          <p:cNvSpPr/>
+          <p:nvPr/>
+        </p:nvSpPr>
+        <p:spPr>
+          <a:xfrm>
+            <a:off x="1566505" y="1515066"/>
+            <a:ext cx="253435" cy="212902"/>
+          </a:xfrm>
+          <a:prstGeom prst="ellipse">
+            <a:avLst/>
+          </a:prstGeom>
+          <a:solidFill>
+            <a:schemeClr val="tx1"/>
+          </a:solidFill>
+          <a:ln>
+            <a:solidFill>
+              <a:schemeClr val="tx1"/>
+            </a:solidFill>
+          </a:ln>
+        </p:spPr>
+        <p:style>
+          <a:lnRef idx="2">
+            <a:schemeClr val="accent1">
+              <a:shade val="50000"/>
+            </a:schemeClr>
+          </a:lnRef>
+          <a:fillRef idx="1">
+            <a:schemeClr val="accent1"/>
+          </a:fillRef>
+          <a:effectRef idx="0">
+            <a:schemeClr val="accent1"/>
+          </a:effectRef>
+          <a:fontRef idx="minor">
+            <a:schemeClr val="lt1"/>
+          </a:fontRef>
+        </p:style>
+        <p:txBody>
+          <a:bodyPr lIns="0" tIns="0" rIns="0" bIns="0" rtlCol="0" anchor="ctr"/>
+          <a:lstStyle/>
+          <a:p>
+            <a:pPr algn="ctr"/>
+            <a:r>
+              <a:rPr lang="en-US" sz="800" dirty="0">
+                <a:latin typeface="Arial" panose="020B0604020202020204" pitchFamily="34" charset="0"/>
+                <a:cs typeface="Arial" panose="020B0604020202020204" pitchFamily="34" charset="0"/>
+              </a:rPr>
+              <a:t>1.1</a:t>
+            </a:r>
+          </a:p>
+        </p:txBody>
+      </p:sp>
+      <p:sp>
+        <p:nvSpPr>
+          <p:cNvPr id="66" name="TextBox 29">
+            <a:extLst>
+              <a:ext uri="{FF2B5EF4-FFF2-40B4-BE49-F238E27FC236}">
+                <a16:creationId xmlns:a16="http://schemas.microsoft.com/office/drawing/2014/main" id="{9E0E69DC-60E3-2C4F-8D4D-5FADBFDF3FC2}"/>
+              </a:ext>
+            </a:extLst>
+          </p:cNvPr>
+          <p:cNvSpPr txBox="1">
+            <a:spLocks noChangeArrowheads="1"/>
+          </p:cNvSpPr>
+          <p:nvPr/>
+        </p:nvSpPr>
+        <p:spPr bwMode="auto">
+          <a:xfrm>
+            <a:off x="1177192" y="4076344"/>
+            <a:ext cx="1119613" cy="261610"/>
+          </a:xfrm>
+          <a:prstGeom prst="rect">
+            <a:avLst/>
+          </a:prstGeom>
+          <a:noFill/>
+          <a:ln>
+            <a:noFill/>
+          </a:ln>
+          <a:extLst>
+            <a:ext uri="{909E8E84-426E-40DD-AFC4-6F175D3DCCD1}">
+              <a14:hiddenFill xmlns:a14="http://schemas.microsoft.com/office/drawing/2010/main">
+                <a:solidFill>
+                  <a:srgbClr val="FFFFFF"/>
+                </a:solidFill>
+              </a14:hiddenFill>
+            </a:ext>
+            <a:ext uri="{91240B29-F687-4F45-9708-019B960494DF}">
+              <a14:hiddenLine xmlns:a14="http://schemas.microsoft.com/office/drawing/2010/main" w="9525">
+                <a:solidFill>
+                  <a:srgbClr val="000000"/>
+                </a:solidFill>
+                <a:miter lim="800000"/>
+                <a:headEnd/>
+                <a:tailEnd/>
+              </a14:hiddenLine>
+            </a:ext>
+          </a:extLst>
+        </p:spPr>
+        <p:txBody>
+          <a:bodyPr wrap="square">
+            <a:spAutoFit/>
+          </a:bodyPr>
+          <a:lstStyle>
+            <a:lvl1pPr>
+              <a:defRPr>
+                <a:solidFill>
+                  <a:schemeClr val="tx1"/>
+                </a:solidFill>
+                <a:latin typeface="Calibri" panose="020F0502020204030204" pitchFamily="34" charset="0"/>
+              </a:defRPr>
+            </a:lvl1pPr>
+            <a:lvl2pPr marL="742950" indent="-285750">
+              <a:defRPr>
+                <a:solidFill>
+                  <a:schemeClr val="tx1"/>
+                </a:solidFill>
+                <a:latin typeface="Calibri" panose="020F0502020204030204" pitchFamily="34" charset="0"/>
+              </a:defRPr>
+            </a:lvl2pPr>
+            <a:lvl3pPr marL="1143000" indent="-228600">
+              <a:defRPr>
+                <a:solidFill>
+                  <a:schemeClr val="tx1"/>
+                </a:solidFill>
+                <a:latin typeface="Calibri" panose="020F0502020204030204" pitchFamily="34" charset="0"/>
+              </a:defRPr>
+            </a:lvl3pPr>
+            <a:lvl4pPr marL="1600200" indent="-228600">
+              <a:defRPr>
+                <a:solidFill>
+                  <a:schemeClr val="tx1"/>
+                </a:solidFill>
+                <a:latin typeface="Calibri" panose="020F0502020204030204" pitchFamily="34" charset="0"/>
+              </a:defRPr>
+            </a:lvl4pPr>
+            <a:lvl5pPr marL="2057400" indent="-228600">
+              <a:defRPr>
+                <a:solidFill>
+                  <a:schemeClr val="tx1"/>
+                </a:solidFill>
+                <a:latin typeface="Calibri" panose="020F0502020204030204" pitchFamily="34" charset="0"/>
+              </a:defRPr>
+            </a:lvl5pPr>
+            <a:lvl6pPr marL="2514600" indent="-228600" eaLnBrk="0" fontAlgn="base" hangingPunct="0">
+              <a:spcBef>
+                <a:spcPct val="0"/>
+              </a:spcBef>
+              <a:spcAft>
+                <a:spcPct val="0"/>
+              </a:spcAft>
+              <a:defRPr>
+                <a:solidFill>
+                  <a:schemeClr val="tx1"/>
+                </a:solidFill>
+                <a:latin typeface="Calibri" panose="020F0502020204030204" pitchFamily="34" charset="0"/>
+              </a:defRPr>
+            </a:lvl6pPr>
+            <a:lvl7pPr marL="2971800" indent="-228600" eaLnBrk="0" fontAlgn="base" hangingPunct="0">
+              <a:spcBef>
+                <a:spcPct val="0"/>
+              </a:spcBef>
+              <a:spcAft>
+                <a:spcPct val="0"/>
+              </a:spcAft>
+              <a:defRPr>
+                <a:solidFill>
+                  <a:schemeClr val="tx1"/>
+                </a:solidFill>
+                <a:latin typeface="Calibri" panose="020F0502020204030204" pitchFamily="34" charset="0"/>
+              </a:defRPr>
+            </a:lvl7pPr>
+            <a:lvl8pPr marL="3429000" indent="-228600" eaLnBrk="0" fontAlgn="base" hangingPunct="0">
+              <a:spcBef>
+                <a:spcPct val="0"/>
+              </a:spcBef>
+              <a:spcAft>
+                <a:spcPct val="0"/>
+              </a:spcAft>
+              <a:defRPr>
+                <a:solidFill>
+                  <a:schemeClr val="tx1"/>
+                </a:solidFill>
+                <a:latin typeface="Calibri" panose="020F0502020204030204" pitchFamily="34" charset="0"/>
+              </a:defRPr>
+            </a:lvl8pPr>
+            <a:lvl9pPr marL="3886200" indent="-228600" eaLnBrk="0" fontAlgn="base" hangingPunct="0">
+              <a:spcBef>
+                <a:spcPct val="0"/>
+              </a:spcBef>
+              <a:spcAft>
+                <a:spcPct val="0"/>
+              </a:spcAft>
+              <a:defRPr>
+                <a:solidFill>
+                  <a:schemeClr val="tx1"/>
+                </a:solidFill>
+                <a:latin typeface="Calibri" panose="020F0502020204030204" pitchFamily="34" charset="0"/>
+              </a:defRPr>
+            </a:lvl9pPr>
+          </a:lstStyle>
+          <a:p>
+            <a:pPr algn="ctr" eaLnBrk="1" hangingPunct="1"/>
+            <a:r>
+              <a:rPr lang="en-US" altLang="en-US" sz="1100" dirty="0">
+                <a:latin typeface="Arial" panose="020B0604020202020204" pitchFamily="34" charset="0"/>
+                <a:ea typeface="Amazon Ember" panose="020B0603020204020204" pitchFamily="34" charset="0"/>
+                <a:cs typeface="Arial" panose="020B0604020202020204" pitchFamily="34" charset="0"/>
+              </a:rPr>
+              <a:t>IAM Roles</a:t>
+            </a:r>
+          </a:p>
+        </p:txBody>
+      </p:sp>
+      <p:pic>
+        <p:nvPicPr>
+          <p:cNvPr id="67" name="Graphic 49">
+            <a:extLst>
+              <a:ext uri="{FF2B5EF4-FFF2-40B4-BE49-F238E27FC236}">
+                <a16:creationId xmlns:a16="http://schemas.microsoft.com/office/drawing/2014/main" id="{C6A8E1EE-C7EC-154E-A17B-9AAAC0C20DBD}"/>
+              </a:ext>
+            </a:extLst>
+          </p:cNvPr>
+          <p:cNvPicPr>
+            <a:picLocks noChangeAspect="1" noChangeArrowheads="1"/>
+          </p:cNvPicPr>
+          <p:nvPr/>
+        </p:nvPicPr>
+        <p:blipFill>
+          <a:blip r:embed="rId7">
+            <a:extLst>
+              <a:ext uri="{28A0092B-C50C-407E-A947-70E740481C1C}">
+                <a14:useLocalDpi xmlns:a14="http://schemas.microsoft.com/office/drawing/2010/main" val="0"/>
+              </a:ext>
+            </a:extLst>
+          </a:blip>
+          <a:srcRect/>
+          <a:stretch>
+            <a:fillRect/>
+          </a:stretch>
+        </p:blipFill>
+        <p:spPr bwMode="auto">
+          <a:xfrm>
+            <a:off x="1492816" y="3726825"/>
+            <a:ext cx="457200" cy="457200"/>
+          </a:xfrm>
+          <a:prstGeom prst="rect">
+            <a:avLst/>
+          </a:prstGeom>
+          <a:noFill/>
+          <a:ln>
+            <a:noFill/>
+          </a:ln>
+          <a:extLst>
+            <a:ext uri="{909E8E84-426E-40DD-AFC4-6F175D3DCCD1}">
+              <a14:hiddenFill xmlns:a14="http://schemas.microsoft.com/office/drawing/2010/main">
+                <a:solidFill>
+                  <a:srgbClr val="FFFFFF"/>
+                </a:solidFill>
+              </a14:hiddenFill>
+            </a:ext>
+            <a:ext uri="{91240B29-F687-4F45-9708-019B960494DF}">
+              <a14:hiddenLine xmlns:a14="http://schemas.microsoft.com/office/drawing/2010/main" w="9525">
+                <a:solidFill>
+                  <a:srgbClr val="000000"/>
+                </a:solidFill>
+                <a:miter lim="800000"/>
+                <a:headEnd/>
+                <a:tailEnd/>
+              </a14:hiddenLine>
+            </a:ext>
+          </a:extLst>
+        </p:spPr>
+      </p:pic>
+      <p:sp>
+        <p:nvSpPr>
+          <p:cNvPr id="132" name="Oval 131">
+            <a:extLst>
+              <a:ext uri="{FF2B5EF4-FFF2-40B4-BE49-F238E27FC236}">
+                <a16:creationId xmlns:a16="http://schemas.microsoft.com/office/drawing/2014/main" id="{E90E9980-B378-8B48-A029-3577A1108948}"/>
+              </a:ext>
+            </a:extLst>
+          </p:cNvPr>
+          <p:cNvSpPr/>
+          <p:nvPr/>
+        </p:nvSpPr>
+        <p:spPr>
+          <a:xfrm>
+            <a:off x="1352222" y="3713257"/>
+            <a:ext cx="253435" cy="212902"/>
+          </a:xfrm>
+          <a:prstGeom prst="ellipse">
+            <a:avLst/>
+          </a:prstGeom>
+          <a:solidFill>
+            <a:schemeClr val="tx1"/>
+          </a:solidFill>
+          <a:ln>
+            <a:solidFill>
+              <a:schemeClr val="tx1"/>
+            </a:solidFill>
+          </a:ln>
+        </p:spPr>
+        <p:style>
+          <a:lnRef idx="2">
+            <a:schemeClr val="accent1">
+              <a:shade val="50000"/>
+            </a:schemeClr>
+          </a:lnRef>
+          <a:fillRef idx="1">
+            <a:schemeClr val="accent1"/>
+          </a:fillRef>
+          <a:effectRef idx="0">
+            <a:schemeClr val="accent1"/>
+          </a:effectRef>
+          <a:fontRef idx="minor">
+            <a:schemeClr val="lt1"/>
+          </a:fontRef>
+        </p:style>
+        <p:txBody>
+          <a:bodyPr lIns="0" tIns="0" rIns="0" bIns="0" rtlCol="0" anchor="ctr"/>
+          <a:lstStyle/>
+          <a:p>
+            <a:pPr algn="ctr"/>
+            <a:r>
+              <a:rPr lang="en-US" sz="800" dirty="0">
+                <a:latin typeface="Arial" panose="020B0604020202020204" pitchFamily="34" charset="0"/>
+                <a:cs typeface="Arial" panose="020B0604020202020204" pitchFamily="34" charset="0"/>
+              </a:rPr>
+              <a:t>1.2</a:t>
+            </a:r>
+          </a:p>
+        </p:txBody>
+      </p:sp>
+      <p:sp>
+        <p:nvSpPr>
+          <p:cNvPr id="90" name="Rectangle 89">
+            <a:extLst>
+              <a:ext uri="{FF2B5EF4-FFF2-40B4-BE49-F238E27FC236}">
+                <a16:creationId xmlns:a16="http://schemas.microsoft.com/office/drawing/2014/main" id="{47B93F37-6BED-7842-BCB8-8257FA6836B8}"/>
+              </a:ext>
+            </a:extLst>
+          </p:cNvPr>
+          <p:cNvSpPr/>
+          <p:nvPr/>
+        </p:nvSpPr>
+        <p:spPr>
+          <a:xfrm>
+            <a:off x="7715694" y="865568"/>
+            <a:ext cx="3455224" cy="2750796"/>
+          </a:xfrm>
+          <a:prstGeom prst="rect">
+            <a:avLst/>
+          </a:prstGeom>
+          <a:noFill/>
+          <a:ln w="12700">
+            <a:solidFill>
+              <a:schemeClr val="tx1"/>
+            </a:solidFill>
+            <a:prstDash val="solid"/>
+          </a:ln>
+        </p:spPr>
+        <p:style>
+          <a:lnRef idx="2">
+            <a:schemeClr val="accent1">
+              <a:shade val="50000"/>
+            </a:schemeClr>
+          </a:lnRef>
+          <a:fillRef idx="1">
+            <a:schemeClr val="accent1"/>
+          </a:fillRef>
+          <a:effectRef idx="0">
+            <a:schemeClr val="accent1"/>
+          </a:effectRef>
+          <a:fontRef idx="minor">
+            <a:schemeClr val="lt1"/>
+          </a:fontRef>
+        </p:style>
+        <p:txBody>
+          <a:bodyPr rot="0" spcFirstLastPara="0" vertOverflow="overflow" horzOverflow="overflow" vert="horz" wrap="square" lIns="91440" tIns="91440" rIns="91440" bIns="45720" numCol="1" spcCol="0" rtlCol="0" fromWordArt="0" anchor="t" anchorCtr="0" forceAA="0" compatLnSpc="1">
+            <a:prstTxWarp prst="textNoShape">
+              <a:avLst/>
+            </a:prstTxWarp>
+            <a:noAutofit/>
+          </a:bodyPr>
+          <a:lstStyle/>
+          <a:p>
+            <a:pPr algn="ctr"/>
+            <a:r>
+              <a:rPr lang="en-US" sz="1400" dirty="0">
+                <a:solidFill>
+                  <a:schemeClr val="tx1"/>
+                </a:solidFill>
+                <a:latin typeface="Arial" panose="020B0604020202020204" pitchFamily="34" charset="0"/>
+                <a:cs typeface="Arial" panose="020B0604020202020204" pitchFamily="34" charset="0"/>
+              </a:rPr>
+              <a:t>All Existing and Future </a:t>
+            </a:r>
+          </a:p>
+          <a:p>
+            <a:pPr algn="ctr"/>
+            <a:r>
+              <a:rPr lang="en-US" sz="1400" dirty="0">
+                <a:solidFill>
+                  <a:schemeClr val="tx1"/>
+                </a:solidFill>
+                <a:latin typeface="Arial" panose="020B0604020202020204" pitchFamily="34" charset="0"/>
+                <a:cs typeface="Arial" panose="020B0604020202020204" pitchFamily="34" charset="0"/>
+              </a:rPr>
+              <a:t>Organization Member Accounts</a:t>
+            </a:r>
+          </a:p>
+        </p:txBody>
+      </p:sp>
+      <p:sp>
+        <p:nvSpPr>
+          <p:cNvPr id="91" name="Oval 90">
+            <a:extLst>
+              <a:ext uri="{FF2B5EF4-FFF2-40B4-BE49-F238E27FC236}">
+                <a16:creationId xmlns:a16="http://schemas.microsoft.com/office/drawing/2014/main" id="{4F6D3A5E-6D06-304A-97F5-69FDBDFDA450}"/>
+              </a:ext>
+            </a:extLst>
+          </p:cNvPr>
+          <p:cNvSpPr/>
+          <p:nvPr/>
+        </p:nvSpPr>
+        <p:spPr>
+          <a:xfrm>
+            <a:off x="7742147" y="887408"/>
+            <a:ext cx="253435" cy="212902"/>
+          </a:xfrm>
+          <a:prstGeom prst="ellipse">
+            <a:avLst/>
+          </a:prstGeom>
+          <a:solidFill>
+            <a:schemeClr val="tx1"/>
+          </a:solidFill>
+          <a:ln>
+            <a:solidFill>
+              <a:schemeClr val="tx1"/>
+            </a:solidFill>
+          </a:ln>
+        </p:spPr>
+        <p:style>
+          <a:lnRef idx="2">
+            <a:schemeClr val="accent1">
+              <a:shade val="50000"/>
+            </a:schemeClr>
+          </a:lnRef>
+          <a:fillRef idx="1">
+            <a:schemeClr val="accent1"/>
+          </a:fillRef>
+          <a:effectRef idx="0">
+            <a:schemeClr val="accent1"/>
+          </a:effectRef>
+          <a:fontRef idx="minor">
+            <a:schemeClr val="lt1"/>
+          </a:fontRef>
+        </p:style>
+        <p:txBody>
+          <a:bodyPr lIns="0" tIns="0" rIns="0" bIns="0" rtlCol="0" anchor="ctr"/>
+          <a:lstStyle/>
+          <a:p>
+            <a:pPr algn="ctr"/>
+            <a:r>
+              <a:rPr lang="en-US" sz="800" dirty="0"/>
+              <a:t>2.0</a:t>
+            </a:r>
+          </a:p>
+        </p:txBody>
+      </p:sp>
+      <p:sp>
+        <p:nvSpPr>
+          <p:cNvPr id="92" name="Rectangle 91">
+            <a:extLst>
+              <a:ext uri="{FF2B5EF4-FFF2-40B4-BE49-F238E27FC236}">
+                <a16:creationId xmlns:a16="http://schemas.microsoft.com/office/drawing/2014/main" id="{00FDA628-A4EA-EB48-92B2-27CAC6AB8DD3}"/>
+              </a:ext>
+            </a:extLst>
+          </p:cNvPr>
+          <p:cNvSpPr/>
+          <p:nvPr/>
+        </p:nvSpPr>
+        <p:spPr>
+          <a:xfrm>
+            <a:off x="7814090" y="1473541"/>
+            <a:ext cx="3260622" cy="1997165"/>
+          </a:xfrm>
+          <a:prstGeom prst="rect">
+            <a:avLst/>
+          </a:prstGeom>
+          <a:noFill/>
+          <a:ln w="12700">
+            <a:solidFill>
+              <a:schemeClr val="tx1"/>
+            </a:solidFill>
+            <a:prstDash val="dash"/>
+          </a:ln>
+        </p:spPr>
+        <p:style>
+          <a:lnRef idx="2">
+            <a:schemeClr val="accent1">
+              <a:shade val="50000"/>
+            </a:schemeClr>
+          </a:lnRef>
+          <a:fillRef idx="1">
+            <a:schemeClr val="accent1"/>
+          </a:fillRef>
+          <a:effectRef idx="0">
+            <a:schemeClr val="accent1"/>
+          </a:effectRef>
+          <a:fontRef idx="minor">
+            <a:schemeClr val="lt1"/>
+          </a:fontRef>
+        </p:style>
+        <p:txBody>
+          <a:bodyPr rot="0" spcFirstLastPara="0" vertOverflow="overflow" horzOverflow="overflow" vert="horz" wrap="square" lIns="91440" tIns="0" rIns="91440" bIns="45720" numCol="1" spcCol="0" rtlCol="0" fromWordArt="0" anchor="t" anchorCtr="0" forceAA="0" compatLnSpc="1">
+            <a:prstTxWarp prst="textNoShape">
+              <a:avLst/>
+            </a:prstTxWarp>
+            <a:noAutofit/>
+          </a:bodyPr>
+          <a:lstStyle/>
+          <a:p>
+            <a:r>
+              <a:rPr lang="en-US" sz="1200" b="1" dirty="0">
+                <a:solidFill>
+                  <a:schemeClr val="tx1"/>
+                </a:solidFill>
+              </a:rPr>
+              <a:t>Home-region</a:t>
+            </a:r>
+          </a:p>
+        </p:txBody>
+      </p:sp>
+      <p:sp>
+        <p:nvSpPr>
+          <p:cNvPr id="93" name="TextBox 92">
+            <a:extLst>
+              <a:ext uri="{FF2B5EF4-FFF2-40B4-BE49-F238E27FC236}">
+                <a16:creationId xmlns:a16="http://schemas.microsoft.com/office/drawing/2014/main" id="{CDCCCE1E-DD4E-3D4B-BE03-47129D861225}"/>
+              </a:ext>
+            </a:extLst>
+          </p:cNvPr>
+          <p:cNvSpPr txBox="1"/>
+          <p:nvPr/>
+        </p:nvSpPr>
+        <p:spPr>
+          <a:xfrm>
+            <a:off x="7995483" y="2211383"/>
+            <a:ext cx="1209667" cy="430887"/>
+          </a:xfrm>
+          <a:prstGeom prst="rect">
+            <a:avLst/>
+          </a:prstGeom>
+          <a:noFill/>
+        </p:spPr>
+        <p:txBody>
+          <a:bodyPr wrap="square" rtlCol="0">
+            <a:spAutoFit/>
+          </a:bodyPr>
+          <a:lstStyle/>
+          <a:p>
+            <a:pPr algn="ctr"/>
+            <a:r>
+              <a:rPr lang="en-US" sz="1100" dirty="0">
+                <a:latin typeface="Arial" panose="020B0604020202020204" pitchFamily="34" charset="0"/>
+                <a:cs typeface="Arial" panose="020B0604020202020204" pitchFamily="34" charset="0"/>
+              </a:rPr>
+              <a:t>AWS CloudFormation</a:t>
+            </a:r>
+          </a:p>
+        </p:txBody>
+      </p:sp>
+      <p:pic>
+        <p:nvPicPr>
+          <p:cNvPr id="94" name="Graphic 93">
+            <a:extLst>
+              <a:ext uri="{FF2B5EF4-FFF2-40B4-BE49-F238E27FC236}">
+                <a16:creationId xmlns:a16="http://schemas.microsoft.com/office/drawing/2014/main" id="{31D7640F-4E48-1D4E-B8F0-CC6DBC330519}"/>
+              </a:ext>
+            </a:extLst>
+          </p:cNvPr>
+          <p:cNvPicPr>
+            <a:picLocks noChangeAspect="1"/>
+          </p:cNvPicPr>
+          <p:nvPr/>
+        </p:nvPicPr>
+        <p:blipFill>
+          <a:blip r:embed="rId5">
+            <a:extLst>
+              <a:ext uri="{96DAC541-7B7A-43D3-8B79-37D633B846F1}">
+                <asvg:svgBlip xmlns:asvg="http://schemas.microsoft.com/office/drawing/2016/SVG/main" r:embed="rId6"/>
+              </a:ext>
+            </a:extLst>
+          </a:blip>
+          <a:stretch>
+            <a:fillRect/>
+          </a:stretch>
+        </p:blipFill>
+        <p:spPr>
+          <a:xfrm>
+            <a:off x="8374824" y="1757780"/>
+            <a:ext cx="457200" cy="457200"/>
+          </a:xfrm>
+          <a:prstGeom prst="rect">
+            <a:avLst/>
+          </a:prstGeom>
+        </p:spPr>
+      </p:pic>
+      <p:sp>
+        <p:nvSpPr>
+          <p:cNvPr id="95" name="Oval 94">
+            <a:extLst>
+              <a:ext uri="{FF2B5EF4-FFF2-40B4-BE49-F238E27FC236}">
+                <a16:creationId xmlns:a16="http://schemas.microsoft.com/office/drawing/2014/main" id="{AD4975BB-DD6D-C54E-B125-5B4B36BCF8AC}"/>
+              </a:ext>
+            </a:extLst>
+          </p:cNvPr>
+          <p:cNvSpPr/>
+          <p:nvPr/>
+        </p:nvSpPr>
+        <p:spPr>
+          <a:xfrm>
+            <a:off x="8390050" y="1773375"/>
+            <a:ext cx="253435" cy="212902"/>
+          </a:xfrm>
+          <a:prstGeom prst="ellipse">
+            <a:avLst/>
+          </a:prstGeom>
+          <a:solidFill>
+            <a:schemeClr val="tx1"/>
+          </a:solidFill>
+          <a:ln>
+            <a:solidFill>
+              <a:schemeClr val="tx1"/>
+            </a:solidFill>
+          </a:ln>
+        </p:spPr>
+        <p:style>
+          <a:lnRef idx="2">
+            <a:schemeClr val="accent1">
+              <a:shade val="50000"/>
+            </a:schemeClr>
+          </a:lnRef>
+          <a:fillRef idx="1">
+            <a:schemeClr val="accent1"/>
+          </a:fillRef>
+          <a:effectRef idx="0">
+            <a:schemeClr val="accent1"/>
+          </a:effectRef>
+          <a:fontRef idx="minor">
+            <a:schemeClr val="lt1"/>
+          </a:fontRef>
+        </p:style>
+        <p:txBody>
+          <a:bodyPr lIns="0" tIns="0" rIns="0" bIns="0" rtlCol="0" anchor="ctr"/>
+          <a:lstStyle/>
+          <a:p>
+            <a:pPr algn="ctr"/>
+            <a:r>
+              <a:rPr lang="en-US" sz="800" dirty="0">
+                <a:latin typeface="Arial" panose="020B0604020202020204" pitchFamily="34" charset="0"/>
+                <a:cs typeface="Arial" panose="020B0604020202020204" pitchFamily="34" charset="0"/>
+              </a:rPr>
+              <a:t>2.1</a:t>
+            </a:r>
+          </a:p>
+        </p:txBody>
+      </p:sp>
+      <p:sp>
+        <p:nvSpPr>
+          <p:cNvPr id="96" name="TextBox 29">
+            <a:extLst>
+              <a:ext uri="{FF2B5EF4-FFF2-40B4-BE49-F238E27FC236}">
+                <a16:creationId xmlns:a16="http://schemas.microsoft.com/office/drawing/2014/main" id="{C618E77E-F039-1E4A-96DB-E5F160FF919B}"/>
+              </a:ext>
+            </a:extLst>
+          </p:cNvPr>
+          <p:cNvSpPr txBox="1">
+            <a:spLocks noChangeArrowheads="1"/>
+          </p:cNvSpPr>
+          <p:nvPr/>
+        </p:nvSpPr>
+        <p:spPr bwMode="auto">
+          <a:xfrm>
+            <a:off x="8114088" y="2972260"/>
+            <a:ext cx="1062976" cy="430887"/>
+          </a:xfrm>
+          <a:prstGeom prst="rect">
+            <a:avLst/>
+          </a:prstGeom>
+          <a:noFill/>
+          <a:ln>
+            <a:noFill/>
+          </a:ln>
+          <a:extLst>
+            <a:ext uri="{909E8E84-426E-40DD-AFC4-6F175D3DCCD1}">
+              <a14:hiddenFill xmlns:a14="http://schemas.microsoft.com/office/drawing/2010/main">
+                <a:solidFill>
+                  <a:srgbClr val="FFFFFF"/>
+                </a:solidFill>
+              </a14:hiddenFill>
+            </a:ext>
+            <a:ext uri="{91240B29-F687-4F45-9708-019B960494DF}">
+              <a14:hiddenLine xmlns:a14="http://schemas.microsoft.com/office/drawing/2010/main" w="9525">
+                <a:solidFill>
+                  <a:srgbClr val="000000"/>
+                </a:solidFill>
+                <a:miter lim="800000"/>
+                <a:headEnd/>
+                <a:tailEnd/>
+              </a14:hiddenLine>
+            </a:ext>
+          </a:extLst>
+        </p:spPr>
+        <p:txBody>
+          <a:bodyPr wrap="square">
+            <a:spAutoFit/>
+          </a:bodyPr>
+          <a:lstStyle>
+            <a:lvl1pPr>
+              <a:defRPr>
+                <a:solidFill>
+                  <a:schemeClr val="tx1"/>
+                </a:solidFill>
+                <a:latin typeface="Calibri" panose="020F0502020204030204" pitchFamily="34" charset="0"/>
+              </a:defRPr>
+            </a:lvl1pPr>
+            <a:lvl2pPr marL="742950" indent="-285750">
+              <a:defRPr>
+                <a:solidFill>
+                  <a:schemeClr val="tx1"/>
+                </a:solidFill>
+                <a:latin typeface="Calibri" panose="020F0502020204030204" pitchFamily="34" charset="0"/>
+              </a:defRPr>
+            </a:lvl2pPr>
+            <a:lvl3pPr marL="1143000" indent="-228600">
+              <a:defRPr>
+                <a:solidFill>
+                  <a:schemeClr val="tx1"/>
+                </a:solidFill>
+                <a:latin typeface="Calibri" panose="020F0502020204030204" pitchFamily="34" charset="0"/>
+              </a:defRPr>
+            </a:lvl3pPr>
+            <a:lvl4pPr marL="1600200" indent="-228600">
+              <a:defRPr>
+                <a:solidFill>
+                  <a:schemeClr val="tx1"/>
+                </a:solidFill>
+                <a:latin typeface="Calibri" panose="020F0502020204030204" pitchFamily="34" charset="0"/>
+              </a:defRPr>
+            </a:lvl4pPr>
+            <a:lvl5pPr marL="2057400" indent="-228600">
+              <a:defRPr>
+                <a:solidFill>
+                  <a:schemeClr val="tx1"/>
+                </a:solidFill>
+                <a:latin typeface="Calibri" panose="020F0502020204030204" pitchFamily="34" charset="0"/>
+              </a:defRPr>
+            </a:lvl5pPr>
+            <a:lvl6pPr marL="2514600" indent="-228600" eaLnBrk="0" fontAlgn="base" hangingPunct="0">
+              <a:spcBef>
+                <a:spcPct val="0"/>
+              </a:spcBef>
+              <a:spcAft>
+                <a:spcPct val="0"/>
+              </a:spcAft>
+              <a:defRPr>
+                <a:solidFill>
+                  <a:schemeClr val="tx1"/>
+                </a:solidFill>
+                <a:latin typeface="Calibri" panose="020F0502020204030204" pitchFamily="34" charset="0"/>
+              </a:defRPr>
+            </a:lvl6pPr>
+            <a:lvl7pPr marL="2971800" indent="-228600" eaLnBrk="0" fontAlgn="base" hangingPunct="0">
+              <a:spcBef>
+                <a:spcPct val="0"/>
+              </a:spcBef>
+              <a:spcAft>
+                <a:spcPct val="0"/>
+              </a:spcAft>
+              <a:defRPr>
+                <a:solidFill>
+                  <a:schemeClr val="tx1"/>
+                </a:solidFill>
+                <a:latin typeface="Calibri" panose="020F0502020204030204" pitchFamily="34" charset="0"/>
+              </a:defRPr>
+            </a:lvl7pPr>
+            <a:lvl8pPr marL="3429000" indent="-228600" eaLnBrk="0" fontAlgn="base" hangingPunct="0">
+              <a:spcBef>
+                <a:spcPct val="0"/>
+              </a:spcBef>
+              <a:spcAft>
+                <a:spcPct val="0"/>
+              </a:spcAft>
+              <a:defRPr>
+                <a:solidFill>
+                  <a:schemeClr val="tx1"/>
+                </a:solidFill>
+                <a:latin typeface="Calibri" panose="020F0502020204030204" pitchFamily="34" charset="0"/>
+              </a:defRPr>
+            </a:lvl8pPr>
+            <a:lvl9pPr marL="3886200" indent="-228600" eaLnBrk="0" fontAlgn="base" hangingPunct="0">
+              <a:spcBef>
+                <a:spcPct val="0"/>
+              </a:spcBef>
+              <a:spcAft>
+                <a:spcPct val="0"/>
+              </a:spcAft>
+              <a:defRPr>
+                <a:solidFill>
+                  <a:schemeClr val="tx1"/>
+                </a:solidFill>
+                <a:latin typeface="Calibri" panose="020F0502020204030204" pitchFamily="34" charset="0"/>
+              </a:defRPr>
+            </a:lvl9pPr>
+          </a:lstStyle>
+          <a:p>
+            <a:pPr algn="ctr"/>
+            <a:r>
+              <a:rPr lang="en-US" altLang="en-US" sz="1100" dirty="0">
+                <a:latin typeface="Arial" panose="020B0604020202020204" pitchFamily="34" charset="0"/>
+                <a:ea typeface="Amazon Ember" panose="020B0603020204020204" pitchFamily="34" charset="0"/>
+                <a:cs typeface="Arial" panose="020B0604020202020204" pitchFamily="34" charset="0"/>
+              </a:rPr>
+              <a:t>Configuration </a:t>
+            </a:r>
+          </a:p>
+          <a:p>
+            <a:pPr algn="ctr"/>
+            <a:r>
+              <a:rPr lang="en-US" altLang="en-US" sz="1100" dirty="0">
+                <a:latin typeface="Arial" panose="020B0604020202020204" pitchFamily="34" charset="0"/>
+                <a:ea typeface="Amazon Ember" panose="020B0603020204020204" pitchFamily="34" charset="0"/>
+                <a:cs typeface="Arial" panose="020B0604020202020204" pitchFamily="34" charset="0"/>
+              </a:rPr>
+              <a:t>Role</a:t>
+            </a:r>
+          </a:p>
+        </p:txBody>
+      </p:sp>
+      <p:pic>
+        <p:nvPicPr>
+          <p:cNvPr id="97" name="Graphic 49">
+            <a:extLst>
+              <a:ext uri="{FF2B5EF4-FFF2-40B4-BE49-F238E27FC236}">
+                <a16:creationId xmlns:a16="http://schemas.microsoft.com/office/drawing/2014/main" id="{142C67C1-85D4-884F-8467-EC8CEA4D39A7}"/>
+              </a:ext>
+            </a:extLst>
+          </p:cNvPr>
+          <p:cNvPicPr>
+            <a:picLocks noChangeAspect="1" noChangeArrowheads="1"/>
+          </p:cNvPicPr>
+          <p:nvPr/>
+        </p:nvPicPr>
+        <p:blipFill>
+          <a:blip r:embed="rId7">
+            <a:extLst>
+              <a:ext uri="{28A0092B-C50C-407E-A947-70E740481C1C}">
+                <a14:useLocalDpi xmlns:a14="http://schemas.microsoft.com/office/drawing/2010/main" val="0"/>
+              </a:ext>
+            </a:extLst>
+          </a:blip>
+          <a:srcRect/>
+          <a:stretch>
+            <a:fillRect/>
+          </a:stretch>
+        </p:blipFill>
+        <p:spPr bwMode="auto">
+          <a:xfrm>
+            <a:off x="8369454" y="2629663"/>
+            <a:ext cx="457200" cy="457200"/>
+          </a:xfrm>
+          <a:prstGeom prst="rect">
+            <a:avLst/>
+          </a:prstGeom>
+          <a:noFill/>
+          <a:ln>
+            <a:noFill/>
+          </a:ln>
+          <a:extLst>
+            <a:ext uri="{909E8E84-426E-40DD-AFC4-6F175D3DCCD1}">
+              <a14:hiddenFill xmlns:a14="http://schemas.microsoft.com/office/drawing/2010/main">
+                <a:solidFill>
+                  <a:srgbClr val="FFFFFF"/>
+                </a:solidFill>
+              </a14:hiddenFill>
+            </a:ext>
+            <a:ext uri="{91240B29-F687-4F45-9708-019B960494DF}">
+              <a14:hiddenLine xmlns:a14="http://schemas.microsoft.com/office/drawing/2010/main" w="9525">
+                <a:solidFill>
+                  <a:srgbClr val="000000"/>
+                </a:solidFill>
+                <a:miter lim="800000"/>
+                <a:headEnd/>
+                <a:tailEnd/>
+              </a14:hiddenLine>
+            </a:ext>
+          </a:extLst>
+        </p:spPr>
+      </p:pic>
+      <p:sp>
+        <p:nvSpPr>
+          <p:cNvPr id="98" name="Oval 97">
+            <a:extLst>
+              <a:ext uri="{FF2B5EF4-FFF2-40B4-BE49-F238E27FC236}">
+                <a16:creationId xmlns:a16="http://schemas.microsoft.com/office/drawing/2014/main" id="{CF03D907-C303-E248-85D2-6E9BA760D360}"/>
+              </a:ext>
+            </a:extLst>
+          </p:cNvPr>
+          <p:cNvSpPr/>
+          <p:nvPr/>
+        </p:nvSpPr>
+        <p:spPr>
+          <a:xfrm>
+            <a:off x="8200497" y="2687703"/>
+            <a:ext cx="253435" cy="212902"/>
+          </a:xfrm>
+          <a:prstGeom prst="ellipse">
+            <a:avLst/>
+          </a:prstGeom>
+          <a:solidFill>
+            <a:schemeClr val="tx1"/>
+          </a:solidFill>
+          <a:ln>
+            <a:solidFill>
+              <a:schemeClr val="tx1"/>
+            </a:solidFill>
+          </a:ln>
+        </p:spPr>
+        <p:style>
+          <a:lnRef idx="2">
+            <a:schemeClr val="accent1">
+              <a:shade val="50000"/>
+            </a:schemeClr>
+          </a:lnRef>
+          <a:fillRef idx="1">
+            <a:schemeClr val="accent1"/>
+          </a:fillRef>
+          <a:effectRef idx="0">
+            <a:schemeClr val="accent1"/>
+          </a:effectRef>
+          <a:fontRef idx="minor">
+            <a:schemeClr val="lt1"/>
+          </a:fontRef>
+        </p:style>
+        <p:txBody>
+          <a:bodyPr lIns="0" tIns="0" rIns="0" bIns="0" rtlCol="0" anchor="ctr"/>
+          <a:lstStyle/>
+          <a:p>
+            <a:pPr algn="ctr"/>
+            <a:r>
+              <a:rPr lang="en-US" sz="800" dirty="0">
+                <a:latin typeface="Arial" panose="020B0604020202020204" pitchFamily="34" charset="0"/>
+                <a:cs typeface="Arial" panose="020B0604020202020204" pitchFamily="34" charset="0"/>
+              </a:rPr>
+              <a:t>2.2</a:t>
+            </a:r>
+          </a:p>
+        </p:txBody>
+      </p:sp>
+      <p:sp>
+        <p:nvSpPr>
+          <p:cNvPr id="119" name="TextBox 2">
+            <a:extLst>
+              <a:ext uri="{FF2B5EF4-FFF2-40B4-BE49-F238E27FC236}">
+                <a16:creationId xmlns:a16="http://schemas.microsoft.com/office/drawing/2014/main" id="{09D97EC6-0028-0C4E-9A5E-FDAE7961F522}"/>
+              </a:ext>
+            </a:extLst>
+          </p:cNvPr>
+          <p:cNvSpPr txBox="1"/>
+          <p:nvPr/>
+        </p:nvSpPr>
+        <p:spPr>
+          <a:xfrm>
+            <a:off x="4235010" y="3035972"/>
+            <a:ext cx="1273984" cy="261610"/>
+          </a:xfrm>
+          <a:prstGeom prst="rect">
+            <a:avLst/>
+          </a:prstGeom>
+          <a:noFill/>
+        </p:spPr>
+        <p:style>
+          <a:lnRef idx="0">
+            <a:scrgbClr r="0" g="0" b="0"/>
+          </a:lnRef>
+          <a:fillRef idx="0">
+            <a:scrgbClr r="0" g="0" b="0"/>
+          </a:fillRef>
+          <a:effectRef idx="0">
+            <a:scrgbClr r="0" g="0" b="0"/>
+          </a:effectRef>
+          <a:fontRef idx="major"/>
+        </p:style>
+        <p:txBody>
+          <a:bodyPr wrap="square" rtlCol="0">
+            <a:spAutoFit/>
+          </a:bodyPr>
+          <a:lstStyle>
+            <a:lvl1pPr>
+              <a:defRPr>
+                <a:latin typeface="+mj-lt"/>
+                <a:ea typeface="+mj-ea"/>
+                <a:cs typeface="+mj-cs"/>
+              </a:defRPr>
+            </a:lvl1pPr>
+            <a:lvl2pPr>
+              <a:defRPr>
+                <a:latin typeface="+mj-lt"/>
+                <a:ea typeface="+mj-ea"/>
+                <a:cs typeface="+mj-cs"/>
+              </a:defRPr>
+            </a:lvl2pPr>
+            <a:lvl3pPr>
+              <a:defRPr>
+                <a:latin typeface="+mj-lt"/>
+                <a:ea typeface="+mj-ea"/>
+                <a:cs typeface="+mj-cs"/>
+              </a:defRPr>
+            </a:lvl3pPr>
+            <a:lvl4pPr>
+              <a:defRPr>
+                <a:latin typeface="+mj-lt"/>
+                <a:ea typeface="+mj-ea"/>
+                <a:cs typeface="+mj-cs"/>
+              </a:defRPr>
+            </a:lvl4pPr>
+            <a:lvl5pPr>
+              <a:defRPr>
+                <a:latin typeface="+mj-lt"/>
+                <a:ea typeface="+mj-ea"/>
+                <a:cs typeface="+mj-cs"/>
+              </a:defRPr>
+            </a:lvl5pPr>
+            <a:lvl6pPr>
+              <a:defRPr>
+                <a:latin typeface="+mj-lt"/>
+                <a:ea typeface="+mj-ea"/>
+                <a:cs typeface="+mj-cs"/>
+              </a:defRPr>
+            </a:lvl6pPr>
+            <a:lvl7pPr>
+              <a:defRPr>
+                <a:latin typeface="+mj-lt"/>
+                <a:ea typeface="+mj-ea"/>
+                <a:cs typeface="+mj-cs"/>
+              </a:defRPr>
+            </a:lvl7pPr>
+            <a:lvl8pPr>
+              <a:defRPr>
+                <a:latin typeface="+mj-lt"/>
+                <a:ea typeface="+mj-ea"/>
+                <a:cs typeface="+mj-cs"/>
+              </a:defRPr>
+            </a:lvl8pPr>
+            <a:lvl9pPr>
+              <a:defRPr>
+                <a:latin typeface="+mj-lt"/>
+                <a:ea typeface="+mj-ea"/>
+                <a:cs typeface="+mj-cs"/>
+              </a:defRPr>
+            </a:lvl9pPr>
+          </a:lstStyle>
+          <a:p>
+            <a:pPr algn="ctr"/>
+            <a:r>
+              <a:rPr lang="en-US" sz="1100" dirty="0">
+                <a:latin typeface="Arial" panose="020B0604020202020204" pitchFamily="34" charset="0"/>
+                <a:cs typeface="Arial" panose="020B0604020202020204" pitchFamily="34" charset="0"/>
+              </a:rPr>
+              <a:t>Lambda Function</a:t>
+            </a:r>
+          </a:p>
+        </p:txBody>
+      </p:sp>
+      <p:sp>
+        <p:nvSpPr>
+          <p:cNvPr id="120" name="TextBox 2">
+            <a:extLst>
+              <a:ext uri="{FF2B5EF4-FFF2-40B4-BE49-F238E27FC236}">
+                <a16:creationId xmlns:a16="http://schemas.microsoft.com/office/drawing/2014/main" id="{45754691-70CD-3F46-A03E-D5A1C0A380AF}"/>
+              </a:ext>
+            </a:extLst>
+          </p:cNvPr>
+          <p:cNvSpPr txBox="1"/>
+          <p:nvPr/>
+        </p:nvSpPr>
+        <p:spPr>
+          <a:xfrm>
+            <a:off x="4423210" y="4083300"/>
+            <a:ext cx="1098724" cy="430887"/>
+          </a:xfrm>
+          <a:prstGeom prst="rect">
+            <a:avLst/>
+          </a:prstGeom>
+          <a:noFill/>
+        </p:spPr>
+        <p:style>
+          <a:lnRef idx="0">
+            <a:scrgbClr r="0" g="0" b="0"/>
+          </a:lnRef>
+          <a:fillRef idx="0">
+            <a:scrgbClr r="0" g="0" b="0"/>
+          </a:fillRef>
+          <a:effectRef idx="0">
+            <a:scrgbClr r="0" g="0" b="0"/>
+          </a:effectRef>
+          <a:fontRef idx="major"/>
+        </p:style>
+        <p:txBody>
+          <a:bodyPr wrap="square" rtlCol="0">
+            <a:spAutoFit/>
+          </a:bodyPr>
+          <a:lstStyle>
+            <a:lvl1pPr>
+              <a:defRPr>
+                <a:latin typeface="+mj-lt"/>
+                <a:ea typeface="+mj-ea"/>
+                <a:cs typeface="+mj-cs"/>
+              </a:defRPr>
+            </a:lvl1pPr>
+            <a:lvl2pPr>
+              <a:defRPr>
+                <a:latin typeface="+mj-lt"/>
+                <a:ea typeface="+mj-ea"/>
+                <a:cs typeface="+mj-cs"/>
+              </a:defRPr>
+            </a:lvl2pPr>
+            <a:lvl3pPr>
+              <a:defRPr>
+                <a:latin typeface="+mj-lt"/>
+                <a:ea typeface="+mj-ea"/>
+                <a:cs typeface="+mj-cs"/>
+              </a:defRPr>
+            </a:lvl3pPr>
+            <a:lvl4pPr>
+              <a:defRPr>
+                <a:latin typeface="+mj-lt"/>
+                <a:ea typeface="+mj-ea"/>
+                <a:cs typeface="+mj-cs"/>
+              </a:defRPr>
+            </a:lvl4pPr>
+            <a:lvl5pPr>
+              <a:defRPr>
+                <a:latin typeface="+mj-lt"/>
+                <a:ea typeface="+mj-ea"/>
+                <a:cs typeface="+mj-cs"/>
+              </a:defRPr>
+            </a:lvl5pPr>
+            <a:lvl6pPr>
+              <a:defRPr>
+                <a:latin typeface="+mj-lt"/>
+                <a:ea typeface="+mj-ea"/>
+                <a:cs typeface="+mj-cs"/>
+              </a:defRPr>
+            </a:lvl6pPr>
+            <a:lvl7pPr>
+              <a:defRPr>
+                <a:latin typeface="+mj-lt"/>
+                <a:ea typeface="+mj-ea"/>
+                <a:cs typeface="+mj-cs"/>
+              </a:defRPr>
+            </a:lvl7pPr>
+            <a:lvl8pPr>
+              <a:defRPr>
+                <a:latin typeface="+mj-lt"/>
+                <a:ea typeface="+mj-ea"/>
+                <a:cs typeface="+mj-cs"/>
+              </a:defRPr>
+            </a:lvl8pPr>
+            <a:lvl9pPr>
+              <a:defRPr>
+                <a:latin typeface="+mj-lt"/>
+                <a:ea typeface="+mj-ea"/>
+                <a:cs typeface="+mj-cs"/>
+              </a:defRPr>
+            </a:lvl9pPr>
+          </a:lstStyle>
+          <a:p>
+            <a:pPr algn="ctr"/>
+            <a:r>
+              <a:rPr lang="en-US" sz="1100" dirty="0">
+                <a:latin typeface="Arial" panose="020B0604020202020204" pitchFamily="34" charset="0"/>
+                <a:cs typeface="Arial" panose="020B0604020202020204" pitchFamily="34" charset="0"/>
+              </a:rPr>
+              <a:t>CloudWatch Log Group</a:t>
+            </a:r>
+          </a:p>
+        </p:txBody>
+      </p:sp>
+      <p:pic>
+        <p:nvPicPr>
+          <p:cNvPr id="134" name="Graphic 13">
+            <a:extLst>
+              <a:ext uri="{FF2B5EF4-FFF2-40B4-BE49-F238E27FC236}">
+                <a16:creationId xmlns:a16="http://schemas.microsoft.com/office/drawing/2014/main" id="{E264F702-84AB-5049-8F85-097823504F5F}"/>
+              </a:ext>
+            </a:extLst>
+          </p:cNvPr>
+          <p:cNvPicPr>
+            <a:picLocks noChangeAspect="1" noChangeArrowheads="1"/>
+          </p:cNvPicPr>
+          <p:nvPr/>
+        </p:nvPicPr>
+        <p:blipFill>
+          <a:blip r:embed="rId8">
+            <a:extLst>
+              <a:ext uri="{28A0092B-C50C-407E-A947-70E740481C1C}">
+                <a14:useLocalDpi xmlns:a14="http://schemas.microsoft.com/office/drawing/2010/main" val="0"/>
+              </a:ext>
+            </a:extLst>
+          </a:blip>
+          <a:srcRect/>
+          <a:stretch>
+            <a:fillRect/>
+          </a:stretch>
+        </p:blipFill>
+        <p:spPr bwMode="auto">
+          <a:xfrm>
+            <a:off x="4632332" y="2586299"/>
+            <a:ext cx="457200" cy="457200"/>
+          </a:xfrm>
+          <a:prstGeom prst="rect">
+            <a:avLst/>
+          </a:prstGeom>
+          <a:noFill/>
+          <a:ln>
+            <a:noFill/>
+          </a:ln>
+          <a:extLst>
+            <a:ext uri="{909E8E84-426E-40DD-AFC4-6F175D3DCCD1}">
+              <a14:hiddenFill xmlns:a14="http://schemas.microsoft.com/office/drawing/2010/main">
+                <a:solidFill>
+                  <a:srgbClr val="FFFFFF"/>
+                </a:solidFill>
+              </a14:hiddenFill>
+            </a:ext>
+            <a:ext uri="{91240B29-F687-4F45-9708-019B960494DF}">
+              <a14:hiddenLine xmlns:a14="http://schemas.microsoft.com/office/drawing/2010/main" w="9525">
+                <a:solidFill>
+                  <a:srgbClr val="000000"/>
+                </a:solidFill>
+                <a:miter lim="800000"/>
+                <a:headEnd/>
+                <a:tailEnd/>
+              </a14:hiddenLine>
+            </a:ext>
+          </a:extLst>
+        </p:spPr>
+      </p:pic>
+      <p:pic>
+        <p:nvPicPr>
+          <p:cNvPr id="137" name="Graphic 7">
+            <a:extLst>
+              <a:ext uri="{FF2B5EF4-FFF2-40B4-BE49-F238E27FC236}">
+                <a16:creationId xmlns:a16="http://schemas.microsoft.com/office/drawing/2014/main" id="{17D44A4F-DA13-4649-B3FC-C06000F8C2B5}"/>
+              </a:ext>
+            </a:extLst>
+          </p:cNvPr>
+          <p:cNvPicPr>
+            <a:picLocks noChangeAspect="1" noChangeArrowheads="1"/>
+          </p:cNvPicPr>
+          <p:nvPr/>
+        </p:nvPicPr>
+        <p:blipFill>
+          <a:blip r:embed="rId9">
+            <a:extLst>
+              <a:ext uri="{28A0092B-C50C-407E-A947-70E740481C1C}">
+                <a14:useLocalDpi xmlns:a14="http://schemas.microsoft.com/office/drawing/2010/main" val="0"/>
+              </a:ext>
+            </a:extLst>
+          </a:blip>
+          <a:srcRect/>
+          <a:stretch>
+            <a:fillRect/>
+          </a:stretch>
+        </p:blipFill>
+        <p:spPr bwMode="auto">
+          <a:xfrm>
+            <a:off x="4743972" y="3665503"/>
+            <a:ext cx="457200" cy="457200"/>
+          </a:xfrm>
+          <a:prstGeom prst="rect">
+            <a:avLst/>
+          </a:prstGeom>
+          <a:noFill/>
+          <a:ln>
+            <a:noFill/>
+          </a:ln>
+          <a:extLst>
+            <a:ext uri="{909E8E84-426E-40DD-AFC4-6F175D3DCCD1}">
+              <a14:hiddenFill xmlns:a14="http://schemas.microsoft.com/office/drawing/2010/main">
+                <a:solidFill>
+                  <a:srgbClr val="FFFFFF"/>
+                </a:solidFill>
+              </a14:hiddenFill>
+            </a:ext>
+            <a:ext uri="{91240B29-F687-4F45-9708-019B960494DF}">
+              <a14:hiddenLine xmlns:a14="http://schemas.microsoft.com/office/drawing/2010/main" w="9525">
+                <a:solidFill>
+                  <a:srgbClr val="000000"/>
+                </a:solidFill>
+                <a:miter lim="800000"/>
+                <a:headEnd/>
+                <a:tailEnd/>
+              </a14:hiddenLine>
+            </a:ext>
+          </a:extLst>
+        </p:spPr>
+      </p:pic>
+      <p:cxnSp>
+        <p:nvCxnSpPr>
+          <p:cNvPr id="139" name="Straight Arrow Connector 138">
+            <a:extLst>
+              <a:ext uri="{FF2B5EF4-FFF2-40B4-BE49-F238E27FC236}">
+                <a16:creationId xmlns:a16="http://schemas.microsoft.com/office/drawing/2014/main" id="{6F9F1E92-7045-184F-BEF3-EB4718C2FDD4}"/>
+              </a:ext>
+            </a:extLst>
+          </p:cNvPr>
+          <p:cNvCxnSpPr>
+            <a:cxnSpLocks/>
+          </p:cNvCxnSpPr>
+          <p:nvPr/>
+        </p:nvCxnSpPr>
+        <p:spPr>
+          <a:xfrm>
+            <a:off x="5325552" y="2806078"/>
+            <a:ext cx="1014811" cy="0"/>
+          </a:xfrm>
+          <a:prstGeom prst="straightConnector1">
+            <a:avLst/>
+          </a:prstGeom>
+          <a:ln>
+            <a:tailEnd type="triangle"/>
+          </a:ln>
+        </p:spPr>
+        <p:style>
+          <a:lnRef idx="1">
+            <a:schemeClr val="dk1"/>
+          </a:lnRef>
+          <a:fillRef idx="0">
+            <a:schemeClr val="dk1"/>
+          </a:fillRef>
+          <a:effectRef idx="0">
+            <a:schemeClr val="dk1"/>
+          </a:effectRef>
+          <a:fontRef idx="minor">
+            <a:schemeClr val="tx1"/>
+          </a:fontRef>
+        </p:style>
+      </p:cxnSp>
+      <p:pic>
+        <p:nvPicPr>
+          <p:cNvPr id="140" name="Graphic 17">
+            <a:extLst>
+              <a:ext uri="{FF2B5EF4-FFF2-40B4-BE49-F238E27FC236}">
+                <a16:creationId xmlns:a16="http://schemas.microsoft.com/office/drawing/2014/main" id="{3E453AD8-6774-644B-BFD4-D0F320AE320C}"/>
+              </a:ext>
+            </a:extLst>
+          </p:cNvPr>
+          <p:cNvPicPr>
+            <a:picLocks noChangeAspect="1" noChangeArrowheads="1"/>
+          </p:cNvPicPr>
+          <p:nvPr/>
+        </p:nvPicPr>
+        <p:blipFill>
+          <a:blip r:embed="rId10">
+            <a:extLst>
+              <a:ext uri="{28A0092B-C50C-407E-A947-70E740481C1C}">
+                <a14:useLocalDpi xmlns:a14="http://schemas.microsoft.com/office/drawing/2010/main" val="0"/>
+              </a:ext>
+            </a:extLst>
+          </a:blip>
+          <a:srcRect/>
+          <a:stretch>
+            <a:fillRect/>
+          </a:stretch>
+        </p:blipFill>
+        <p:spPr bwMode="auto">
+          <a:xfrm>
+            <a:off x="5900235" y="3730688"/>
+            <a:ext cx="457200" cy="457200"/>
+          </a:xfrm>
+          <a:prstGeom prst="rect">
+            <a:avLst/>
+          </a:prstGeom>
+          <a:noFill/>
+          <a:ln>
+            <a:noFill/>
+          </a:ln>
+          <a:extLst>
+            <a:ext uri="{909E8E84-426E-40DD-AFC4-6F175D3DCCD1}">
+              <a14:hiddenFill xmlns:a14="http://schemas.microsoft.com/office/drawing/2010/main">
+                <a:solidFill>
+                  <a:srgbClr val="FFFFFF"/>
+                </a:solidFill>
+              </a14:hiddenFill>
+            </a:ext>
+            <a:ext uri="{91240B29-F687-4F45-9708-019B960494DF}">
+              <a14:hiddenLine xmlns:a14="http://schemas.microsoft.com/office/drawing/2010/main" w="9525">
+                <a:solidFill>
+                  <a:srgbClr val="000000"/>
+                </a:solidFill>
+                <a:miter lim="800000"/>
+                <a:headEnd/>
+                <a:tailEnd/>
+              </a14:hiddenLine>
+            </a:ext>
+          </a:extLst>
+        </p:spPr>
+      </p:pic>
+      <p:sp>
+        <p:nvSpPr>
+          <p:cNvPr id="141" name="TextBox 2">
+            <a:extLst>
+              <a:ext uri="{FF2B5EF4-FFF2-40B4-BE49-F238E27FC236}">
+                <a16:creationId xmlns:a16="http://schemas.microsoft.com/office/drawing/2014/main" id="{C6D44061-2569-1B46-9036-419DA1FED4C5}"/>
+              </a:ext>
+            </a:extLst>
+          </p:cNvPr>
+          <p:cNvSpPr txBox="1"/>
+          <p:nvPr/>
+        </p:nvSpPr>
+        <p:spPr>
+          <a:xfrm>
+            <a:off x="5666186" y="4137225"/>
+            <a:ext cx="917042" cy="261610"/>
+          </a:xfrm>
+          <a:prstGeom prst="rect">
+            <a:avLst/>
+          </a:prstGeom>
+          <a:noFill/>
+        </p:spPr>
+        <p:style>
+          <a:lnRef idx="0">
+            <a:scrgbClr r="0" g="0" b="0"/>
+          </a:lnRef>
+          <a:fillRef idx="0">
+            <a:scrgbClr r="0" g="0" b="0"/>
+          </a:fillRef>
+          <a:effectRef idx="0">
+            <a:scrgbClr r="0" g="0" b="0"/>
+          </a:effectRef>
+          <a:fontRef idx="major"/>
+        </p:style>
+        <p:txBody>
+          <a:bodyPr wrap="square" rtlCol="0">
+            <a:spAutoFit/>
+          </a:bodyPr>
+          <a:lstStyle>
+            <a:lvl1pPr>
+              <a:defRPr>
+                <a:latin typeface="+mj-lt"/>
+                <a:ea typeface="+mj-ea"/>
+                <a:cs typeface="+mj-cs"/>
+              </a:defRPr>
+            </a:lvl1pPr>
+            <a:lvl2pPr>
+              <a:defRPr>
+                <a:latin typeface="+mj-lt"/>
+                <a:ea typeface="+mj-ea"/>
+                <a:cs typeface="+mj-cs"/>
+              </a:defRPr>
+            </a:lvl2pPr>
+            <a:lvl3pPr>
+              <a:defRPr>
+                <a:latin typeface="+mj-lt"/>
+                <a:ea typeface="+mj-ea"/>
+                <a:cs typeface="+mj-cs"/>
+              </a:defRPr>
+            </a:lvl3pPr>
+            <a:lvl4pPr>
+              <a:defRPr>
+                <a:latin typeface="+mj-lt"/>
+                <a:ea typeface="+mj-ea"/>
+                <a:cs typeface="+mj-cs"/>
+              </a:defRPr>
+            </a:lvl4pPr>
+            <a:lvl5pPr>
+              <a:defRPr>
+                <a:latin typeface="+mj-lt"/>
+                <a:ea typeface="+mj-ea"/>
+                <a:cs typeface="+mj-cs"/>
+              </a:defRPr>
+            </a:lvl5pPr>
+            <a:lvl6pPr>
+              <a:defRPr>
+                <a:latin typeface="+mj-lt"/>
+                <a:ea typeface="+mj-ea"/>
+                <a:cs typeface="+mj-cs"/>
+              </a:defRPr>
+            </a:lvl6pPr>
+            <a:lvl7pPr>
+              <a:defRPr>
+                <a:latin typeface="+mj-lt"/>
+                <a:ea typeface="+mj-ea"/>
+                <a:cs typeface="+mj-cs"/>
+              </a:defRPr>
+            </a:lvl7pPr>
+            <a:lvl8pPr>
+              <a:defRPr>
+                <a:latin typeface="+mj-lt"/>
+                <a:ea typeface="+mj-ea"/>
+                <a:cs typeface="+mj-cs"/>
+              </a:defRPr>
+            </a:lvl8pPr>
+            <a:lvl9pPr>
+              <a:defRPr>
+                <a:latin typeface="+mj-lt"/>
+                <a:ea typeface="+mj-ea"/>
+                <a:cs typeface="+mj-cs"/>
+              </a:defRPr>
+            </a:lvl9pPr>
+          </a:lstStyle>
+          <a:p>
+            <a:pPr algn="ctr"/>
+            <a:r>
+              <a:rPr lang="en-US" sz="1100" dirty="0">
+                <a:latin typeface="Arial" panose="020B0604020202020204" pitchFamily="34" charset="0"/>
+                <a:cs typeface="Arial" panose="020B0604020202020204" pitchFamily="34" charset="0"/>
+              </a:rPr>
+              <a:t>SNS Topic</a:t>
+            </a:r>
+          </a:p>
+        </p:txBody>
+      </p:sp>
+      <p:cxnSp>
+        <p:nvCxnSpPr>
+          <p:cNvPr id="142" name="Straight Arrow Connector 141">
+            <a:extLst>
+              <a:ext uri="{FF2B5EF4-FFF2-40B4-BE49-F238E27FC236}">
+                <a16:creationId xmlns:a16="http://schemas.microsoft.com/office/drawing/2014/main" id="{6AC1F448-93BB-DF44-8A4D-6BA33939E91A}"/>
+              </a:ext>
+            </a:extLst>
+          </p:cNvPr>
+          <p:cNvCxnSpPr>
+            <a:cxnSpLocks/>
+          </p:cNvCxnSpPr>
+          <p:nvPr/>
+        </p:nvCxnSpPr>
+        <p:spPr>
+          <a:xfrm flipV="1">
+            <a:off x="4874878" y="2033200"/>
+            <a:ext cx="0" cy="465600"/>
+          </a:xfrm>
+          <a:prstGeom prst="straightConnector1">
+            <a:avLst/>
+          </a:prstGeom>
+          <a:ln>
+            <a:tailEnd type="triangle"/>
+          </a:ln>
+        </p:spPr>
+        <p:style>
+          <a:lnRef idx="1">
+            <a:schemeClr val="dk1"/>
+          </a:lnRef>
+          <a:fillRef idx="0">
+            <a:schemeClr val="dk1"/>
+          </a:fillRef>
+          <a:effectRef idx="0">
+            <a:schemeClr val="dk1"/>
+          </a:effectRef>
+          <a:fontRef idx="minor">
+            <a:schemeClr val="tx1"/>
+          </a:fontRef>
+        </p:style>
+      </p:cxnSp>
+      <p:pic>
+        <p:nvPicPr>
+          <p:cNvPr id="143" name="Graphic 17">
+            <a:extLst>
+              <a:ext uri="{FF2B5EF4-FFF2-40B4-BE49-F238E27FC236}">
+                <a16:creationId xmlns:a16="http://schemas.microsoft.com/office/drawing/2014/main" id="{C463399F-CD72-F24D-BC42-32926859F30A}"/>
+              </a:ext>
+            </a:extLst>
+          </p:cNvPr>
+          <p:cNvPicPr>
+            <a:picLocks noChangeAspect="1" noChangeArrowheads="1"/>
+          </p:cNvPicPr>
+          <p:nvPr/>
+        </p:nvPicPr>
+        <p:blipFill>
+          <a:blip r:embed="rId10">
+            <a:extLst>
+              <a:ext uri="{28A0092B-C50C-407E-A947-70E740481C1C}">
+                <a14:useLocalDpi xmlns:a14="http://schemas.microsoft.com/office/drawing/2010/main" val="0"/>
+              </a:ext>
+            </a:extLst>
+          </a:blip>
+          <a:srcRect/>
+          <a:stretch>
+            <a:fillRect/>
+          </a:stretch>
+        </p:blipFill>
+        <p:spPr bwMode="auto">
+          <a:xfrm>
+            <a:off x="5883163" y="1333998"/>
+            <a:ext cx="457200" cy="457200"/>
+          </a:xfrm>
+          <a:prstGeom prst="rect">
+            <a:avLst/>
+          </a:prstGeom>
+          <a:noFill/>
+          <a:ln>
+            <a:noFill/>
+          </a:ln>
+          <a:extLst>
+            <a:ext uri="{909E8E84-426E-40DD-AFC4-6F175D3DCCD1}">
+              <a14:hiddenFill xmlns:a14="http://schemas.microsoft.com/office/drawing/2010/main">
+                <a:solidFill>
+                  <a:srgbClr val="FFFFFF"/>
+                </a:solidFill>
+              </a14:hiddenFill>
+            </a:ext>
+            <a:ext uri="{91240B29-F687-4F45-9708-019B960494DF}">
+              <a14:hiddenLine xmlns:a14="http://schemas.microsoft.com/office/drawing/2010/main" w="9525">
+                <a:solidFill>
+                  <a:srgbClr val="000000"/>
+                </a:solidFill>
+                <a:miter lim="800000"/>
+                <a:headEnd/>
+                <a:tailEnd/>
+              </a14:hiddenLine>
+            </a:ext>
+          </a:extLst>
+        </p:spPr>
+      </p:pic>
+      <p:sp>
+        <p:nvSpPr>
+          <p:cNvPr id="144" name="TextBox 2">
+            <a:extLst>
+              <a:ext uri="{FF2B5EF4-FFF2-40B4-BE49-F238E27FC236}">
+                <a16:creationId xmlns:a16="http://schemas.microsoft.com/office/drawing/2014/main" id="{60F8FEA4-10F0-B34C-B65D-C6E13A093E9B}"/>
+              </a:ext>
+            </a:extLst>
+          </p:cNvPr>
+          <p:cNvSpPr txBox="1"/>
+          <p:nvPr/>
+        </p:nvSpPr>
+        <p:spPr>
+          <a:xfrm>
+            <a:off x="5648638" y="1736028"/>
+            <a:ext cx="932275" cy="261610"/>
+          </a:xfrm>
+          <a:prstGeom prst="rect">
+            <a:avLst/>
+          </a:prstGeom>
+          <a:noFill/>
+        </p:spPr>
+        <p:style>
+          <a:lnRef idx="0">
+            <a:scrgbClr r="0" g="0" b="0"/>
+          </a:lnRef>
+          <a:fillRef idx="0">
+            <a:scrgbClr r="0" g="0" b="0"/>
+          </a:fillRef>
+          <a:effectRef idx="0">
+            <a:scrgbClr r="0" g="0" b="0"/>
+          </a:effectRef>
+          <a:fontRef idx="major"/>
+        </p:style>
+        <p:txBody>
+          <a:bodyPr wrap="square" rtlCol="0">
+            <a:spAutoFit/>
+          </a:bodyPr>
+          <a:lstStyle>
+            <a:lvl1pPr>
+              <a:defRPr>
+                <a:latin typeface="+mj-lt"/>
+                <a:ea typeface="+mj-ea"/>
+                <a:cs typeface="+mj-cs"/>
+              </a:defRPr>
+            </a:lvl1pPr>
+            <a:lvl2pPr>
+              <a:defRPr>
+                <a:latin typeface="+mj-lt"/>
+                <a:ea typeface="+mj-ea"/>
+                <a:cs typeface="+mj-cs"/>
+              </a:defRPr>
+            </a:lvl2pPr>
+            <a:lvl3pPr>
+              <a:defRPr>
+                <a:latin typeface="+mj-lt"/>
+                <a:ea typeface="+mj-ea"/>
+                <a:cs typeface="+mj-cs"/>
+              </a:defRPr>
+            </a:lvl3pPr>
+            <a:lvl4pPr>
+              <a:defRPr>
+                <a:latin typeface="+mj-lt"/>
+                <a:ea typeface="+mj-ea"/>
+                <a:cs typeface="+mj-cs"/>
+              </a:defRPr>
+            </a:lvl4pPr>
+            <a:lvl5pPr>
+              <a:defRPr>
+                <a:latin typeface="+mj-lt"/>
+                <a:ea typeface="+mj-ea"/>
+                <a:cs typeface="+mj-cs"/>
+              </a:defRPr>
+            </a:lvl5pPr>
+            <a:lvl6pPr>
+              <a:defRPr>
+                <a:latin typeface="+mj-lt"/>
+                <a:ea typeface="+mj-ea"/>
+                <a:cs typeface="+mj-cs"/>
+              </a:defRPr>
+            </a:lvl6pPr>
+            <a:lvl7pPr>
+              <a:defRPr>
+                <a:latin typeface="+mj-lt"/>
+                <a:ea typeface="+mj-ea"/>
+                <a:cs typeface="+mj-cs"/>
+              </a:defRPr>
+            </a:lvl7pPr>
+            <a:lvl8pPr>
+              <a:defRPr>
+                <a:latin typeface="+mj-lt"/>
+                <a:ea typeface="+mj-ea"/>
+                <a:cs typeface="+mj-cs"/>
+              </a:defRPr>
+            </a:lvl8pPr>
+            <a:lvl9pPr>
+              <a:defRPr>
+                <a:latin typeface="+mj-lt"/>
+                <a:ea typeface="+mj-ea"/>
+                <a:cs typeface="+mj-cs"/>
+              </a:defRPr>
+            </a:lvl9pPr>
+          </a:lstStyle>
+          <a:p>
+            <a:pPr algn="ctr"/>
+            <a:r>
+              <a:rPr lang="en-US" sz="1100" dirty="0">
+                <a:latin typeface="Arial" panose="020B0604020202020204" pitchFamily="34" charset="0"/>
+                <a:cs typeface="Arial" panose="020B0604020202020204" pitchFamily="34" charset="0"/>
+              </a:rPr>
+              <a:t>Alarm Topic</a:t>
+            </a:r>
+          </a:p>
+        </p:txBody>
+      </p:sp>
+      <p:cxnSp>
+        <p:nvCxnSpPr>
+          <p:cNvPr id="145" name="Straight Arrow Connector 144">
+            <a:extLst>
+              <a:ext uri="{FF2B5EF4-FFF2-40B4-BE49-F238E27FC236}">
+                <a16:creationId xmlns:a16="http://schemas.microsoft.com/office/drawing/2014/main" id="{5B9F94BA-2974-E943-A8F4-271E121B2E50}"/>
+              </a:ext>
+            </a:extLst>
+          </p:cNvPr>
+          <p:cNvCxnSpPr>
+            <a:cxnSpLocks/>
+          </p:cNvCxnSpPr>
+          <p:nvPr/>
+        </p:nvCxnSpPr>
+        <p:spPr>
+          <a:xfrm>
+            <a:off x="5389963" y="3354165"/>
+            <a:ext cx="370348" cy="341173"/>
+          </a:xfrm>
+          <a:prstGeom prst="straightConnector1">
+            <a:avLst/>
+          </a:prstGeom>
+          <a:ln>
+            <a:headEnd type="triangle"/>
+            <a:tailEnd type="triangle"/>
+          </a:ln>
+        </p:spPr>
+        <p:style>
+          <a:lnRef idx="1">
+            <a:schemeClr val="dk1"/>
+          </a:lnRef>
+          <a:fillRef idx="0">
+            <a:schemeClr val="dk1"/>
+          </a:fillRef>
+          <a:effectRef idx="0">
+            <a:schemeClr val="dk1"/>
+          </a:effectRef>
+          <a:fontRef idx="minor">
+            <a:schemeClr val="tx1"/>
+          </a:fontRef>
+        </p:style>
+      </p:cxnSp>
+      <p:pic>
+        <p:nvPicPr>
+          <p:cNvPr id="146" name="Graphic 29">
+            <a:extLst>
+              <a:ext uri="{FF2B5EF4-FFF2-40B4-BE49-F238E27FC236}">
+                <a16:creationId xmlns:a16="http://schemas.microsoft.com/office/drawing/2014/main" id="{0FF21F99-2EF3-1341-A04B-AE41D9D90B3D}"/>
+              </a:ext>
+            </a:extLst>
+          </p:cNvPr>
+          <p:cNvPicPr>
+            <a:picLocks noChangeAspect="1" noChangeArrowheads="1"/>
+          </p:cNvPicPr>
+          <p:nvPr/>
+        </p:nvPicPr>
+        <p:blipFill>
+          <a:blip r:embed="rId11">
+            <a:extLst>
+              <a:ext uri="{28A0092B-C50C-407E-A947-70E740481C1C}">
+                <a14:useLocalDpi xmlns:a14="http://schemas.microsoft.com/office/drawing/2010/main" val="0"/>
+              </a:ext>
+            </a:extLst>
+          </a:blip>
+          <a:srcRect/>
+          <a:stretch>
+            <a:fillRect/>
+          </a:stretch>
+        </p:blipFill>
+        <p:spPr bwMode="auto">
+          <a:xfrm>
+            <a:off x="4632083" y="1333612"/>
+            <a:ext cx="457200" cy="457200"/>
+          </a:xfrm>
+          <a:prstGeom prst="rect">
+            <a:avLst/>
+          </a:prstGeom>
+          <a:noFill/>
+          <a:ln>
+            <a:noFill/>
+          </a:ln>
+          <a:extLst>
+            <a:ext uri="{909E8E84-426E-40DD-AFC4-6F175D3DCCD1}">
+              <a14:hiddenFill xmlns:a14="http://schemas.microsoft.com/office/drawing/2010/main">
+                <a:solidFill>
+                  <a:srgbClr val="FFFFFF"/>
+                </a:solidFill>
+              </a14:hiddenFill>
+            </a:ext>
+            <a:ext uri="{91240B29-F687-4F45-9708-019B960494DF}">
+              <a14:hiddenLine xmlns:a14="http://schemas.microsoft.com/office/drawing/2010/main" w="9525">
+                <a:solidFill>
+                  <a:srgbClr val="000000"/>
+                </a:solidFill>
+                <a:miter lim="800000"/>
+                <a:headEnd/>
+                <a:tailEnd/>
+              </a14:hiddenLine>
+            </a:ext>
+          </a:extLst>
+        </p:spPr>
+      </p:pic>
+      <p:sp>
+        <p:nvSpPr>
+          <p:cNvPr id="147" name="TextBox 2">
+            <a:extLst>
+              <a:ext uri="{FF2B5EF4-FFF2-40B4-BE49-F238E27FC236}">
+                <a16:creationId xmlns:a16="http://schemas.microsoft.com/office/drawing/2014/main" id="{D07F4FDD-98C6-834B-A019-A6C5CB347B86}"/>
+              </a:ext>
+            </a:extLst>
+          </p:cNvPr>
+          <p:cNvSpPr txBox="1"/>
+          <p:nvPr/>
+        </p:nvSpPr>
+        <p:spPr>
+          <a:xfrm>
+            <a:off x="4393277" y="1708101"/>
+            <a:ext cx="932275" cy="261610"/>
+          </a:xfrm>
+          <a:prstGeom prst="rect">
+            <a:avLst/>
+          </a:prstGeom>
+          <a:noFill/>
+        </p:spPr>
+        <p:style>
+          <a:lnRef idx="0">
+            <a:scrgbClr r="0" g="0" b="0"/>
+          </a:lnRef>
+          <a:fillRef idx="0">
+            <a:scrgbClr r="0" g="0" b="0"/>
+          </a:fillRef>
+          <a:effectRef idx="0">
+            <a:scrgbClr r="0" g="0" b="0"/>
+          </a:effectRef>
+          <a:fontRef idx="major"/>
+        </p:style>
+        <p:txBody>
+          <a:bodyPr wrap="square" rtlCol="0">
+            <a:spAutoFit/>
+          </a:bodyPr>
+          <a:lstStyle>
+            <a:lvl1pPr>
+              <a:defRPr>
+                <a:latin typeface="+mj-lt"/>
+                <a:ea typeface="+mj-ea"/>
+                <a:cs typeface="+mj-cs"/>
+              </a:defRPr>
+            </a:lvl1pPr>
+            <a:lvl2pPr>
+              <a:defRPr>
+                <a:latin typeface="+mj-lt"/>
+                <a:ea typeface="+mj-ea"/>
+                <a:cs typeface="+mj-cs"/>
+              </a:defRPr>
+            </a:lvl2pPr>
+            <a:lvl3pPr>
+              <a:defRPr>
+                <a:latin typeface="+mj-lt"/>
+                <a:ea typeface="+mj-ea"/>
+                <a:cs typeface="+mj-cs"/>
+              </a:defRPr>
+            </a:lvl3pPr>
+            <a:lvl4pPr>
+              <a:defRPr>
+                <a:latin typeface="+mj-lt"/>
+                <a:ea typeface="+mj-ea"/>
+                <a:cs typeface="+mj-cs"/>
+              </a:defRPr>
+            </a:lvl4pPr>
+            <a:lvl5pPr>
+              <a:defRPr>
+                <a:latin typeface="+mj-lt"/>
+                <a:ea typeface="+mj-ea"/>
+                <a:cs typeface="+mj-cs"/>
+              </a:defRPr>
+            </a:lvl5pPr>
+            <a:lvl6pPr>
+              <a:defRPr>
+                <a:latin typeface="+mj-lt"/>
+                <a:ea typeface="+mj-ea"/>
+                <a:cs typeface="+mj-cs"/>
+              </a:defRPr>
+            </a:lvl6pPr>
+            <a:lvl7pPr>
+              <a:defRPr>
+                <a:latin typeface="+mj-lt"/>
+                <a:ea typeface="+mj-ea"/>
+                <a:cs typeface="+mj-cs"/>
+              </a:defRPr>
+            </a:lvl7pPr>
+            <a:lvl8pPr>
+              <a:defRPr>
+                <a:latin typeface="+mj-lt"/>
+                <a:ea typeface="+mj-ea"/>
+                <a:cs typeface="+mj-cs"/>
+              </a:defRPr>
+            </a:lvl8pPr>
+            <a:lvl9pPr>
+              <a:defRPr>
+                <a:latin typeface="+mj-lt"/>
+                <a:ea typeface="+mj-ea"/>
+                <a:cs typeface="+mj-cs"/>
+              </a:defRPr>
+            </a:lvl9pPr>
+          </a:lstStyle>
+          <a:p>
+            <a:pPr algn="ctr"/>
+            <a:r>
+              <a:rPr lang="en-US" sz="1100" dirty="0">
+                <a:latin typeface="Arial" panose="020B0604020202020204" pitchFamily="34" charset="0"/>
+                <a:cs typeface="Arial" panose="020B0604020202020204" pitchFamily="34" charset="0"/>
+              </a:rPr>
+              <a:t>DLQ</a:t>
+            </a:r>
+          </a:p>
+        </p:txBody>
+      </p:sp>
+      <p:sp>
+        <p:nvSpPr>
+          <p:cNvPr id="149" name="Oval 148">
+            <a:extLst>
+              <a:ext uri="{FF2B5EF4-FFF2-40B4-BE49-F238E27FC236}">
+                <a16:creationId xmlns:a16="http://schemas.microsoft.com/office/drawing/2014/main" id="{3CC9224A-2DE7-2F4C-98C8-378C4081EB31}"/>
+              </a:ext>
+            </a:extLst>
+          </p:cNvPr>
+          <p:cNvSpPr/>
+          <p:nvPr/>
+        </p:nvSpPr>
+        <p:spPr>
+          <a:xfrm>
+            <a:off x="4507018" y="1379800"/>
+            <a:ext cx="253435" cy="212902"/>
+          </a:xfrm>
+          <a:prstGeom prst="ellipse">
+            <a:avLst/>
+          </a:prstGeom>
+          <a:solidFill>
+            <a:schemeClr val="tx1"/>
+          </a:solidFill>
+          <a:ln>
+            <a:solidFill>
+              <a:schemeClr val="tx1"/>
+            </a:solidFill>
+          </a:ln>
+        </p:spPr>
+        <p:style>
+          <a:lnRef idx="2">
+            <a:schemeClr val="accent1">
+              <a:shade val="50000"/>
+            </a:schemeClr>
+          </a:lnRef>
+          <a:fillRef idx="1">
+            <a:schemeClr val="accent1"/>
+          </a:fillRef>
+          <a:effectRef idx="0">
+            <a:schemeClr val="accent1"/>
+          </a:effectRef>
+          <a:fontRef idx="minor">
+            <a:schemeClr val="lt1"/>
+          </a:fontRef>
+        </p:style>
+        <p:txBody>
+          <a:bodyPr lIns="0" tIns="0" rIns="0" bIns="0" rtlCol="0" anchor="ctr"/>
+          <a:lstStyle/>
+          <a:p>
+            <a:pPr algn="ctr"/>
+            <a:r>
+              <a:rPr lang="en-US" sz="800" dirty="0">
+                <a:latin typeface="Arial" panose="020B0604020202020204" pitchFamily="34" charset="0"/>
+                <a:cs typeface="Arial" panose="020B0604020202020204" pitchFamily="34" charset="0"/>
+              </a:rPr>
+              <a:t>1.5</a:t>
+            </a:r>
+          </a:p>
+        </p:txBody>
+      </p:sp>
+      <p:cxnSp>
+        <p:nvCxnSpPr>
+          <p:cNvPr id="154" name="Straight Arrow Connector 153">
+            <a:extLst>
+              <a:ext uri="{FF2B5EF4-FFF2-40B4-BE49-F238E27FC236}">
+                <a16:creationId xmlns:a16="http://schemas.microsoft.com/office/drawing/2014/main" id="{178FA32A-4097-1246-B4E1-FDF39B065443}"/>
+              </a:ext>
+            </a:extLst>
+          </p:cNvPr>
+          <p:cNvCxnSpPr>
+            <a:cxnSpLocks/>
+          </p:cNvCxnSpPr>
+          <p:nvPr/>
+        </p:nvCxnSpPr>
+        <p:spPr>
+          <a:xfrm>
+            <a:off x="5265266" y="1562598"/>
+            <a:ext cx="400920" cy="0"/>
+          </a:xfrm>
+          <a:prstGeom prst="straightConnector1">
+            <a:avLst/>
+          </a:prstGeom>
+          <a:ln>
+            <a:tailEnd type="triangle"/>
+          </a:ln>
+        </p:spPr>
+        <p:style>
+          <a:lnRef idx="1">
+            <a:schemeClr val="dk1"/>
+          </a:lnRef>
+          <a:fillRef idx="0">
+            <a:schemeClr val="dk1"/>
+          </a:fillRef>
+          <a:effectRef idx="0">
+            <a:schemeClr val="dk1"/>
+          </a:effectRef>
+          <a:fontRef idx="minor">
+            <a:schemeClr val="tx1"/>
+          </a:fontRef>
+        </p:style>
+      </p:cxnSp>
+      <p:cxnSp>
+        <p:nvCxnSpPr>
+          <p:cNvPr id="155" name="Straight Arrow Connector 154">
+            <a:extLst>
+              <a:ext uri="{FF2B5EF4-FFF2-40B4-BE49-F238E27FC236}">
+                <a16:creationId xmlns:a16="http://schemas.microsoft.com/office/drawing/2014/main" id="{88282EE8-7EF2-AC47-8C1E-AE339048FB62}"/>
+              </a:ext>
+            </a:extLst>
+          </p:cNvPr>
+          <p:cNvCxnSpPr>
+            <a:cxnSpLocks/>
+          </p:cNvCxnSpPr>
+          <p:nvPr/>
+        </p:nvCxnSpPr>
+        <p:spPr>
+          <a:xfrm>
+            <a:off x="4874878" y="3335775"/>
+            <a:ext cx="0" cy="329728"/>
+          </a:xfrm>
+          <a:prstGeom prst="straightConnector1">
+            <a:avLst/>
+          </a:prstGeom>
+          <a:ln>
+            <a:tailEnd type="triangle"/>
+          </a:ln>
+        </p:spPr>
+        <p:style>
+          <a:lnRef idx="1">
+            <a:schemeClr val="dk1"/>
+          </a:lnRef>
+          <a:fillRef idx="0">
+            <a:schemeClr val="dk1"/>
+          </a:fillRef>
+          <a:effectRef idx="0">
+            <a:schemeClr val="dk1"/>
+          </a:effectRef>
+          <a:fontRef idx="minor">
+            <a:schemeClr val="tx1"/>
+          </a:fontRef>
+        </p:style>
+      </p:cxnSp>
+      <p:pic>
+        <p:nvPicPr>
+          <p:cNvPr id="87" name="Graphic 7">
+            <a:extLst>
+              <a:ext uri="{FF2B5EF4-FFF2-40B4-BE49-F238E27FC236}">
+                <a16:creationId xmlns:a16="http://schemas.microsoft.com/office/drawing/2014/main" id="{4D8931AE-C748-A942-9BB3-7C6BD6574416}"/>
+              </a:ext>
+            </a:extLst>
+          </p:cNvPr>
+          <p:cNvPicPr>
+            <a:picLocks noChangeAspect="1" noChangeArrowheads="1"/>
+          </p:cNvPicPr>
+          <p:nvPr/>
+        </p:nvPicPr>
+        <p:blipFill>
+          <a:blip r:embed="rId12">
+            <a:extLst>
+              <a:ext uri="{96DAC541-7B7A-43D3-8B79-37D633B846F1}">
+                <asvg:svgBlip xmlns:asvg="http://schemas.microsoft.com/office/drawing/2016/SVG/main" r:embed="rId13"/>
+              </a:ext>
+            </a:extLst>
+          </a:blip>
+          <a:srcRect/>
+          <a:stretch/>
+        </p:blipFill>
+        <p:spPr bwMode="auto">
+          <a:xfrm>
+            <a:off x="10047288" y="2032357"/>
+            <a:ext cx="457200" cy="457200"/>
+          </a:xfrm>
+          <a:prstGeom prst="rect">
+            <a:avLst/>
+          </a:prstGeom>
+          <a:noFill/>
+          <a:ln>
+            <a:noFill/>
+          </a:ln>
+          <a:extLst>
+            <a:ext uri="{909E8E84-426E-40DD-AFC4-6F175D3DCCD1}">
+              <a14:hiddenFill xmlns:a14="http://schemas.microsoft.com/office/drawing/2010/main">
+                <a:solidFill>
+                  <a:srgbClr val="FFFFFF"/>
+                </a:solidFill>
+              </a14:hiddenFill>
+            </a:ext>
+            <a:ext uri="{91240B29-F687-4F45-9708-019B960494DF}">
+              <a14:hiddenLine xmlns:a14="http://schemas.microsoft.com/office/drawing/2010/main" w="9525">
+                <a:solidFill>
+                  <a:srgbClr val="000000"/>
+                </a:solidFill>
+                <a:miter lim="800000"/>
+                <a:headEnd/>
+                <a:tailEnd/>
+              </a14:hiddenLine>
+            </a:ext>
+          </a:extLst>
+        </p:spPr>
+      </p:pic>
+      <p:sp>
+        <p:nvSpPr>
+          <p:cNvPr id="88" name="TextBox 29">
+            <a:extLst>
+              <a:ext uri="{FF2B5EF4-FFF2-40B4-BE49-F238E27FC236}">
+                <a16:creationId xmlns:a16="http://schemas.microsoft.com/office/drawing/2014/main" id="{3BCAAC4C-DAE6-F047-A271-EE0401158076}"/>
+              </a:ext>
+            </a:extLst>
+          </p:cNvPr>
+          <p:cNvSpPr txBox="1">
+            <a:spLocks noChangeArrowheads="1"/>
+          </p:cNvSpPr>
+          <p:nvPr/>
+        </p:nvSpPr>
+        <p:spPr bwMode="auto">
+          <a:xfrm>
+            <a:off x="9601718" y="2471667"/>
+            <a:ext cx="1348340" cy="430887"/>
+          </a:xfrm>
+          <a:prstGeom prst="rect">
+            <a:avLst/>
+          </a:prstGeom>
+          <a:noFill/>
+          <a:ln>
+            <a:noFill/>
+          </a:ln>
+          <a:extLst>
+            <a:ext uri="{909E8E84-426E-40DD-AFC4-6F175D3DCCD1}">
+              <a14:hiddenFill xmlns:a14="http://schemas.microsoft.com/office/drawing/2010/main">
+                <a:solidFill>
+                  <a:srgbClr val="FFFFFF"/>
+                </a:solidFill>
+              </a14:hiddenFill>
+            </a:ext>
+            <a:ext uri="{91240B29-F687-4F45-9708-019B960494DF}">
+              <a14:hiddenLine xmlns:a14="http://schemas.microsoft.com/office/drawing/2010/main" w="9525">
+                <a:solidFill>
+                  <a:srgbClr val="000000"/>
+                </a:solidFill>
+                <a:miter lim="800000"/>
+                <a:headEnd/>
+                <a:tailEnd/>
+              </a14:hiddenLine>
+            </a:ext>
+          </a:extLst>
+        </p:spPr>
+        <p:txBody>
+          <a:bodyPr wrap="square">
+            <a:spAutoFit/>
+          </a:bodyPr>
+          <a:lstStyle>
+            <a:lvl1pPr>
+              <a:defRPr>
+                <a:solidFill>
+                  <a:schemeClr val="tx1"/>
+                </a:solidFill>
+                <a:latin typeface="Calibri" panose="020F0502020204030204" pitchFamily="34" charset="0"/>
+              </a:defRPr>
+            </a:lvl1pPr>
+            <a:lvl2pPr marL="742950" indent="-285750">
+              <a:defRPr>
+                <a:solidFill>
+                  <a:schemeClr val="tx1"/>
+                </a:solidFill>
+                <a:latin typeface="Calibri" panose="020F0502020204030204" pitchFamily="34" charset="0"/>
+              </a:defRPr>
+            </a:lvl2pPr>
+            <a:lvl3pPr marL="1143000" indent="-228600">
+              <a:defRPr>
+                <a:solidFill>
+                  <a:schemeClr val="tx1"/>
+                </a:solidFill>
+                <a:latin typeface="Calibri" panose="020F0502020204030204" pitchFamily="34" charset="0"/>
+              </a:defRPr>
+            </a:lvl3pPr>
+            <a:lvl4pPr marL="1600200" indent="-228600">
+              <a:defRPr>
+                <a:solidFill>
+                  <a:schemeClr val="tx1"/>
+                </a:solidFill>
+                <a:latin typeface="Calibri" panose="020F0502020204030204" pitchFamily="34" charset="0"/>
+              </a:defRPr>
+            </a:lvl4pPr>
+            <a:lvl5pPr marL="2057400" indent="-228600">
+              <a:defRPr>
+                <a:solidFill>
+                  <a:schemeClr val="tx1"/>
+                </a:solidFill>
+                <a:latin typeface="Calibri" panose="020F0502020204030204" pitchFamily="34" charset="0"/>
+              </a:defRPr>
+            </a:lvl5pPr>
+            <a:lvl6pPr marL="2514600" indent="-228600" eaLnBrk="0" fontAlgn="base" hangingPunct="0">
+              <a:spcBef>
+                <a:spcPct val="0"/>
+              </a:spcBef>
+              <a:spcAft>
+                <a:spcPct val="0"/>
+              </a:spcAft>
+              <a:defRPr>
+                <a:solidFill>
+                  <a:schemeClr val="tx1"/>
+                </a:solidFill>
+                <a:latin typeface="Calibri" panose="020F0502020204030204" pitchFamily="34" charset="0"/>
+              </a:defRPr>
+            </a:lvl6pPr>
+            <a:lvl7pPr marL="2971800" indent="-228600" eaLnBrk="0" fontAlgn="base" hangingPunct="0">
+              <a:spcBef>
+                <a:spcPct val="0"/>
+              </a:spcBef>
+              <a:spcAft>
+                <a:spcPct val="0"/>
+              </a:spcAft>
+              <a:defRPr>
+                <a:solidFill>
+                  <a:schemeClr val="tx1"/>
+                </a:solidFill>
+                <a:latin typeface="Calibri" panose="020F0502020204030204" pitchFamily="34" charset="0"/>
+              </a:defRPr>
+            </a:lvl7pPr>
+            <a:lvl8pPr marL="3429000" indent="-228600" eaLnBrk="0" fontAlgn="base" hangingPunct="0">
+              <a:spcBef>
+                <a:spcPct val="0"/>
+              </a:spcBef>
+              <a:spcAft>
+                <a:spcPct val="0"/>
+              </a:spcAft>
+              <a:defRPr>
+                <a:solidFill>
+                  <a:schemeClr val="tx1"/>
+                </a:solidFill>
+                <a:latin typeface="Calibri" panose="020F0502020204030204" pitchFamily="34" charset="0"/>
+              </a:defRPr>
+            </a:lvl8pPr>
+            <a:lvl9pPr marL="3886200" indent="-228600" eaLnBrk="0" fontAlgn="base" hangingPunct="0">
+              <a:spcBef>
+                <a:spcPct val="0"/>
+              </a:spcBef>
+              <a:spcAft>
+                <a:spcPct val="0"/>
+              </a:spcAft>
+              <a:defRPr>
+                <a:solidFill>
+                  <a:schemeClr val="tx1"/>
+                </a:solidFill>
+                <a:latin typeface="Calibri" panose="020F0502020204030204" pitchFamily="34" charset="0"/>
+              </a:defRPr>
+            </a:lvl9pPr>
+          </a:lstStyle>
+          <a:p>
+            <a:pPr algn="ctr"/>
+            <a:r>
+              <a:rPr lang="en-US" altLang="en-US" sz="1100" dirty="0">
+                <a:latin typeface="Arial" panose="020B0604020202020204" pitchFamily="34" charset="0"/>
+                <a:ea typeface="Amazon Ember" panose="020B0603020204020204" pitchFamily="34" charset="0"/>
+                <a:cs typeface="Arial" panose="020B0604020202020204" pitchFamily="34" charset="0"/>
+              </a:rPr>
+              <a:t>Account Alternate Contacts</a:t>
+            </a:r>
+          </a:p>
+        </p:txBody>
+      </p:sp>
+      <p:sp>
+        <p:nvSpPr>
+          <p:cNvPr id="89" name="Oval 88">
+            <a:extLst>
+              <a:ext uri="{FF2B5EF4-FFF2-40B4-BE49-F238E27FC236}">
+                <a16:creationId xmlns:a16="http://schemas.microsoft.com/office/drawing/2014/main" id="{9A70F314-5C75-6548-B911-0D3F6A6178C1}"/>
+              </a:ext>
+            </a:extLst>
+          </p:cNvPr>
+          <p:cNvSpPr/>
+          <p:nvPr/>
+        </p:nvSpPr>
+        <p:spPr>
+          <a:xfrm>
+            <a:off x="10072161" y="2064871"/>
+            <a:ext cx="253435" cy="212902"/>
+          </a:xfrm>
+          <a:prstGeom prst="ellipse">
+            <a:avLst/>
+          </a:prstGeom>
+          <a:solidFill>
+            <a:schemeClr val="tx1"/>
+          </a:solidFill>
+          <a:ln>
+            <a:solidFill>
+              <a:schemeClr val="tx1"/>
+            </a:solidFill>
+          </a:ln>
+        </p:spPr>
+        <p:style>
+          <a:lnRef idx="2">
+            <a:schemeClr val="accent1">
+              <a:shade val="50000"/>
+            </a:schemeClr>
+          </a:lnRef>
+          <a:fillRef idx="1">
+            <a:schemeClr val="accent1"/>
+          </a:fillRef>
+          <a:effectRef idx="0">
+            <a:schemeClr val="accent1"/>
+          </a:effectRef>
+          <a:fontRef idx="minor">
+            <a:schemeClr val="lt1"/>
+          </a:fontRef>
+        </p:style>
+        <p:txBody>
+          <a:bodyPr lIns="0" tIns="0" rIns="0" bIns="0" rtlCol="0" anchor="ctr"/>
+          <a:lstStyle/>
+          <a:p>
+            <a:pPr algn="ctr"/>
+            <a:r>
+              <a:rPr lang="en-US" sz="800" dirty="0">
+                <a:latin typeface="Arial" panose="020B0604020202020204" pitchFamily="34" charset="0"/>
+                <a:cs typeface="Arial" panose="020B0604020202020204" pitchFamily="34" charset="0"/>
+              </a:rPr>
+              <a:t>2.3</a:t>
+            </a:r>
+          </a:p>
+        </p:txBody>
+      </p:sp>
+      <p:pic>
+        <p:nvPicPr>
+          <p:cNvPr id="105" name="Graphic 7">
+            <a:extLst>
+              <a:ext uri="{FF2B5EF4-FFF2-40B4-BE49-F238E27FC236}">
+                <a16:creationId xmlns:a16="http://schemas.microsoft.com/office/drawing/2014/main" id="{42221EA7-4EA3-654C-B09B-98995C4651F0}"/>
+              </a:ext>
+            </a:extLst>
+          </p:cNvPr>
+          <p:cNvPicPr>
+            <a:picLocks noChangeAspect="1" noChangeArrowheads="1"/>
+          </p:cNvPicPr>
+          <p:nvPr/>
+        </p:nvPicPr>
+        <p:blipFill>
+          <a:blip r:embed="rId12">
+            <a:extLst>
+              <a:ext uri="{96DAC541-7B7A-43D3-8B79-37D633B846F1}">
+                <asvg:svgBlip xmlns:asvg="http://schemas.microsoft.com/office/drawing/2016/SVG/main" r:embed="rId13"/>
+              </a:ext>
+            </a:extLst>
+          </a:blip>
+          <a:srcRect/>
+          <a:stretch/>
+        </p:blipFill>
+        <p:spPr bwMode="auto">
+          <a:xfrm>
+            <a:off x="6479158" y="2574442"/>
+            <a:ext cx="457200" cy="457200"/>
+          </a:xfrm>
+          <a:prstGeom prst="rect">
+            <a:avLst/>
+          </a:prstGeom>
+          <a:noFill/>
+          <a:ln>
+            <a:noFill/>
+          </a:ln>
+          <a:extLst>
+            <a:ext uri="{909E8E84-426E-40DD-AFC4-6F175D3DCCD1}">
+              <a14:hiddenFill xmlns:a14="http://schemas.microsoft.com/office/drawing/2010/main">
+                <a:solidFill>
+                  <a:srgbClr val="FFFFFF"/>
+                </a:solidFill>
+              </a14:hiddenFill>
+            </a:ext>
+            <a:ext uri="{91240B29-F687-4F45-9708-019B960494DF}">
+              <a14:hiddenLine xmlns:a14="http://schemas.microsoft.com/office/drawing/2010/main" w="9525">
+                <a:solidFill>
+                  <a:srgbClr val="000000"/>
+                </a:solidFill>
+                <a:miter lim="800000"/>
+                <a:headEnd/>
+                <a:tailEnd/>
+              </a14:hiddenLine>
+            </a:ext>
+          </a:extLst>
+        </p:spPr>
+      </p:pic>
+      <p:sp>
+        <p:nvSpPr>
+          <p:cNvPr id="106" name="TextBox 29">
+            <a:extLst>
+              <a:ext uri="{FF2B5EF4-FFF2-40B4-BE49-F238E27FC236}">
+                <a16:creationId xmlns:a16="http://schemas.microsoft.com/office/drawing/2014/main" id="{4D650F84-A6D6-C148-9BB1-AA904DB286A2}"/>
+              </a:ext>
+            </a:extLst>
+          </p:cNvPr>
+          <p:cNvSpPr txBox="1">
+            <a:spLocks noChangeArrowheads="1"/>
+          </p:cNvSpPr>
+          <p:nvPr/>
+        </p:nvSpPr>
+        <p:spPr bwMode="auto">
+          <a:xfrm>
+            <a:off x="6033588" y="3013752"/>
+            <a:ext cx="1348340" cy="430887"/>
+          </a:xfrm>
+          <a:prstGeom prst="rect">
+            <a:avLst/>
+          </a:prstGeom>
+          <a:noFill/>
+          <a:ln>
+            <a:noFill/>
+          </a:ln>
+          <a:extLst>
+            <a:ext uri="{909E8E84-426E-40DD-AFC4-6F175D3DCCD1}">
+              <a14:hiddenFill xmlns:a14="http://schemas.microsoft.com/office/drawing/2010/main">
+                <a:solidFill>
+                  <a:srgbClr val="FFFFFF"/>
+                </a:solidFill>
+              </a14:hiddenFill>
+            </a:ext>
+            <a:ext uri="{91240B29-F687-4F45-9708-019B960494DF}">
+              <a14:hiddenLine xmlns:a14="http://schemas.microsoft.com/office/drawing/2010/main" w="9525">
+                <a:solidFill>
+                  <a:srgbClr val="000000"/>
+                </a:solidFill>
+                <a:miter lim="800000"/>
+                <a:headEnd/>
+                <a:tailEnd/>
+              </a14:hiddenLine>
+            </a:ext>
+          </a:extLst>
+        </p:spPr>
+        <p:txBody>
+          <a:bodyPr wrap="square">
+            <a:spAutoFit/>
+          </a:bodyPr>
+          <a:lstStyle>
+            <a:lvl1pPr>
+              <a:defRPr>
+                <a:solidFill>
+                  <a:schemeClr val="tx1"/>
+                </a:solidFill>
+                <a:latin typeface="Calibri" panose="020F0502020204030204" pitchFamily="34" charset="0"/>
+              </a:defRPr>
+            </a:lvl1pPr>
+            <a:lvl2pPr marL="742950" indent="-285750">
+              <a:defRPr>
+                <a:solidFill>
+                  <a:schemeClr val="tx1"/>
+                </a:solidFill>
+                <a:latin typeface="Calibri" panose="020F0502020204030204" pitchFamily="34" charset="0"/>
+              </a:defRPr>
+            </a:lvl2pPr>
+            <a:lvl3pPr marL="1143000" indent="-228600">
+              <a:defRPr>
+                <a:solidFill>
+                  <a:schemeClr val="tx1"/>
+                </a:solidFill>
+                <a:latin typeface="Calibri" panose="020F0502020204030204" pitchFamily="34" charset="0"/>
+              </a:defRPr>
+            </a:lvl3pPr>
+            <a:lvl4pPr marL="1600200" indent="-228600">
+              <a:defRPr>
+                <a:solidFill>
+                  <a:schemeClr val="tx1"/>
+                </a:solidFill>
+                <a:latin typeface="Calibri" panose="020F0502020204030204" pitchFamily="34" charset="0"/>
+              </a:defRPr>
+            </a:lvl4pPr>
+            <a:lvl5pPr marL="2057400" indent="-228600">
+              <a:defRPr>
+                <a:solidFill>
+                  <a:schemeClr val="tx1"/>
+                </a:solidFill>
+                <a:latin typeface="Calibri" panose="020F0502020204030204" pitchFamily="34" charset="0"/>
+              </a:defRPr>
+            </a:lvl5pPr>
+            <a:lvl6pPr marL="2514600" indent="-228600" eaLnBrk="0" fontAlgn="base" hangingPunct="0">
+              <a:spcBef>
+                <a:spcPct val="0"/>
+              </a:spcBef>
+              <a:spcAft>
+                <a:spcPct val="0"/>
+              </a:spcAft>
+              <a:defRPr>
+                <a:solidFill>
+                  <a:schemeClr val="tx1"/>
+                </a:solidFill>
+                <a:latin typeface="Calibri" panose="020F0502020204030204" pitchFamily="34" charset="0"/>
+              </a:defRPr>
+            </a:lvl6pPr>
+            <a:lvl7pPr marL="2971800" indent="-228600" eaLnBrk="0" fontAlgn="base" hangingPunct="0">
+              <a:spcBef>
+                <a:spcPct val="0"/>
+              </a:spcBef>
+              <a:spcAft>
+                <a:spcPct val="0"/>
+              </a:spcAft>
+              <a:defRPr>
+                <a:solidFill>
+                  <a:schemeClr val="tx1"/>
+                </a:solidFill>
+                <a:latin typeface="Calibri" panose="020F0502020204030204" pitchFamily="34" charset="0"/>
+              </a:defRPr>
+            </a:lvl7pPr>
+            <a:lvl8pPr marL="3429000" indent="-228600" eaLnBrk="0" fontAlgn="base" hangingPunct="0">
+              <a:spcBef>
+                <a:spcPct val="0"/>
+              </a:spcBef>
+              <a:spcAft>
+                <a:spcPct val="0"/>
+              </a:spcAft>
+              <a:defRPr>
+                <a:solidFill>
+                  <a:schemeClr val="tx1"/>
+                </a:solidFill>
+                <a:latin typeface="Calibri" panose="020F0502020204030204" pitchFamily="34" charset="0"/>
+              </a:defRPr>
+            </a:lvl8pPr>
+            <a:lvl9pPr marL="3886200" indent="-228600" eaLnBrk="0" fontAlgn="base" hangingPunct="0">
+              <a:spcBef>
+                <a:spcPct val="0"/>
+              </a:spcBef>
+              <a:spcAft>
+                <a:spcPct val="0"/>
+              </a:spcAft>
+              <a:defRPr>
+                <a:solidFill>
+                  <a:schemeClr val="tx1"/>
+                </a:solidFill>
+                <a:latin typeface="Calibri" panose="020F0502020204030204" pitchFamily="34" charset="0"/>
+              </a:defRPr>
+            </a:lvl9pPr>
+          </a:lstStyle>
+          <a:p>
+            <a:pPr algn="ctr"/>
+            <a:r>
+              <a:rPr lang="en-US" altLang="en-US" sz="1100" dirty="0">
+                <a:latin typeface="Arial" panose="020B0604020202020204" pitchFamily="34" charset="0"/>
+                <a:ea typeface="Amazon Ember" panose="020B0603020204020204" pitchFamily="34" charset="0"/>
+                <a:cs typeface="Arial" panose="020B0604020202020204" pitchFamily="34" charset="0"/>
+              </a:rPr>
+              <a:t>Account Alternate Contacts</a:t>
+            </a:r>
+          </a:p>
+        </p:txBody>
+      </p:sp>
+      <p:pic>
+        <p:nvPicPr>
+          <p:cNvPr id="57" name="Graphic 24">
+            <a:extLst>
+              <a:ext uri="{FF2B5EF4-FFF2-40B4-BE49-F238E27FC236}">
+                <a16:creationId xmlns:a16="http://schemas.microsoft.com/office/drawing/2014/main" id="{781BDB30-FB26-EE42-A1DD-E00BE0518E47}"/>
+              </a:ext>
+            </a:extLst>
+          </p:cNvPr>
+          <p:cNvPicPr>
+            <a:picLocks noChangeAspect="1" noChangeArrowheads="1"/>
+          </p:cNvPicPr>
+          <p:nvPr/>
+        </p:nvPicPr>
+        <p:blipFill>
+          <a:blip r:embed="rId14">
+            <a:extLst>
+              <a:ext uri="{28A0092B-C50C-407E-A947-70E740481C1C}">
+                <a14:useLocalDpi xmlns:a14="http://schemas.microsoft.com/office/drawing/2010/main" val="0"/>
+              </a:ext>
+            </a:extLst>
+          </a:blip>
+          <a:srcRect/>
+          <a:stretch>
+            <a:fillRect/>
+          </a:stretch>
+        </p:blipFill>
+        <p:spPr bwMode="auto">
+          <a:xfrm>
+            <a:off x="2815304" y="2583358"/>
+            <a:ext cx="457200" cy="457200"/>
+          </a:xfrm>
+          <a:prstGeom prst="rect">
+            <a:avLst/>
+          </a:prstGeom>
+          <a:noFill/>
+          <a:ln>
+            <a:noFill/>
+          </a:ln>
+          <a:extLst>
+            <a:ext uri="{909E8E84-426E-40DD-AFC4-6F175D3DCCD1}">
+              <a14:hiddenFill xmlns:a14="http://schemas.microsoft.com/office/drawing/2010/main">
+                <a:solidFill>
+                  <a:srgbClr val="FFFFFF"/>
+                </a:solidFill>
+              </a14:hiddenFill>
+            </a:ext>
+            <a:ext uri="{91240B29-F687-4F45-9708-019B960494DF}">
+              <a14:hiddenLine xmlns:a14="http://schemas.microsoft.com/office/drawing/2010/main" w="9525">
+                <a:solidFill>
+                  <a:srgbClr val="000000"/>
+                </a:solidFill>
+                <a:miter lim="800000"/>
+                <a:headEnd/>
+                <a:tailEnd/>
+              </a14:hiddenLine>
+            </a:ext>
+          </a:extLst>
+        </p:spPr>
+      </p:pic>
+      <p:sp>
+        <p:nvSpPr>
+          <p:cNvPr id="58" name="TextBox 26">
+            <a:extLst>
+              <a:ext uri="{FF2B5EF4-FFF2-40B4-BE49-F238E27FC236}">
+                <a16:creationId xmlns:a16="http://schemas.microsoft.com/office/drawing/2014/main" id="{C2DDCC73-27CE-3645-B625-339B85EB0E66}"/>
+              </a:ext>
+            </a:extLst>
+          </p:cNvPr>
+          <p:cNvSpPr txBox="1">
+            <a:spLocks noChangeArrowheads="1"/>
+          </p:cNvSpPr>
+          <p:nvPr/>
+        </p:nvSpPr>
+        <p:spPr bwMode="auto">
+          <a:xfrm>
+            <a:off x="2532628" y="2972259"/>
+            <a:ext cx="1041265" cy="430887"/>
+          </a:xfrm>
+          <a:prstGeom prst="rect">
+            <a:avLst/>
+          </a:prstGeom>
+          <a:noFill/>
+          <a:ln>
+            <a:noFill/>
+          </a:ln>
+          <a:extLst>
+            <a:ext uri="{909E8E84-426E-40DD-AFC4-6F175D3DCCD1}">
+              <a14:hiddenFill xmlns:a14="http://schemas.microsoft.com/office/drawing/2010/main">
+                <a:solidFill>
+                  <a:srgbClr val="FFFFFF"/>
+                </a:solidFill>
+              </a14:hiddenFill>
+            </a:ext>
+            <a:ext uri="{91240B29-F687-4F45-9708-019B960494DF}">
+              <a14:hiddenLine xmlns:a14="http://schemas.microsoft.com/office/drawing/2010/main" w="9525">
+                <a:solidFill>
+                  <a:srgbClr val="000000"/>
+                </a:solidFill>
+                <a:miter lim="800000"/>
+                <a:headEnd/>
+                <a:tailEnd/>
+              </a14:hiddenLine>
+            </a:ext>
+          </a:extLst>
+        </p:spPr>
+        <p:txBody>
+          <a:bodyPr wrap="square">
+            <a:spAutoFit/>
+          </a:bodyPr>
+          <a:lstStyle>
+            <a:lvl1pPr>
+              <a:defRPr>
+                <a:solidFill>
+                  <a:schemeClr val="tx1"/>
+                </a:solidFill>
+                <a:latin typeface="Calibri" panose="020F0502020204030204" pitchFamily="34" charset="0"/>
+              </a:defRPr>
+            </a:lvl1pPr>
+            <a:lvl2pPr marL="742950" indent="-285750">
+              <a:defRPr>
+                <a:solidFill>
+                  <a:schemeClr val="tx1"/>
+                </a:solidFill>
+                <a:latin typeface="Calibri" panose="020F0502020204030204" pitchFamily="34" charset="0"/>
+              </a:defRPr>
+            </a:lvl2pPr>
+            <a:lvl3pPr marL="1143000" indent="-228600">
+              <a:defRPr>
+                <a:solidFill>
+                  <a:schemeClr val="tx1"/>
+                </a:solidFill>
+                <a:latin typeface="Calibri" panose="020F0502020204030204" pitchFamily="34" charset="0"/>
+              </a:defRPr>
+            </a:lvl3pPr>
+            <a:lvl4pPr marL="1600200" indent="-228600">
+              <a:defRPr>
+                <a:solidFill>
+                  <a:schemeClr val="tx1"/>
+                </a:solidFill>
+                <a:latin typeface="Calibri" panose="020F0502020204030204" pitchFamily="34" charset="0"/>
+              </a:defRPr>
+            </a:lvl4pPr>
+            <a:lvl5pPr marL="2057400" indent="-228600">
+              <a:defRPr>
+                <a:solidFill>
+                  <a:schemeClr val="tx1"/>
+                </a:solidFill>
+                <a:latin typeface="Calibri" panose="020F0502020204030204" pitchFamily="34" charset="0"/>
+              </a:defRPr>
+            </a:lvl5pPr>
+            <a:lvl6pPr marL="2514600" indent="-228600" eaLnBrk="0" fontAlgn="base" hangingPunct="0">
+              <a:spcBef>
+                <a:spcPct val="0"/>
+              </a:spcBef>
+              <a:spcAft>
+                <a:spcPct val="0"/>
+              </a:spcAft>
+              <a:defRPr>
+                <a:solidFill>
+                  <a:schemeClr val="tx1"/>
+                </a:solidFill>
+                <a:latin typeface="Calibri" panose="020F0502020204030204" pitchFamily="34" charset="0"/>
+              </a:defRPr>
+            </a:lvl6pPr>
+            <a:lvl7pPr marL="2971800" indent="-228600" eaLnBrk="0" fontAlgn="base" hangingPunct="0">
+              <a:spcBef>
+                <a:spcPct val="0"/>
+              </a:spcBef>
+              <a:spcAft>
+                <a:spcPct val="0"/>
+              </a:spcAft>
+              <a:defRPr>
+                <a:solidFill>
+                  <a:schemeClr val="tx1"/>
+                </a:solidFill>
+                <a:latin typeface="Calibri" panose="020F0502020204030204" pitchFamily="34" charset="0"/>
+              </a:defRPr>
+            </a:lvl7pPr>
+            <a:lvl8pPr marL="3429000" indent="-228600" eaLnBrk="0" fontAlgn="base" hangingPunct="0">
+              <a:spcBef>
+                <a:spcPct val="0"/>
+              </a:spcBef>
+              <a:spcAft>
+                <a:spcPct val="0"/>
+              </a:spcAft>
+              <a:defRPr>
+                <a:solidFill>
+                  <a:schemeClr val="tx1"/>
+                </a:solidFill>
+                <a:latin typeface="Calibri" panose="020F0502020204030204" pitchFamily="34" charset="0"/>
+              </a:defRPr>
+            </a:lvl8pPr>
+            <a:lvl9pPr marL="3886200" indent="-228600" eaLnBrk="0" fontAlgn="base" hangingPunct="0">
+              <a:spcBef>
+                <a:spcPct val="0"/>
+              </a:spcBef>
+              <a:spcAft>
+                <a:spcPct val="0"/>
+              </a:spcAft>
+              <a:defRPr>
+                <a:solidFill>
+                  <a:schemeClr val="tx1"/>
+                </a:solidFill>
+                <a:latin typeface="Calibri" panose="020F0502020204030204" pitchFamily="34" charset="0"/>
+              </a:defRPr>
+            </a:lvl9pPr>
+          </a:lstStyle>
+          <a:p>
+            <a:pPr algn="ctr" eaLnBrk="1" hangingPunct="1"/>
+            <a:r>
+              <a:rPr lang="en-US" altLang="en-US" sz="1100" dirty="0">
+                <a:latin typeface="Arial" panose="020B0604020202020204" pitchFamily="34" charset="0"/>
+                <a:ea typeface="Amazon Ember" panose="020B0603020204020204" pitchFamily="34" charset="0"/>
+                <a:cs typeface="Arial" panose="020B0604020202020204" pitchFamily="34" charset="0"/>
+              </a:rPr>
+              <a:t>Regional Event Rules</a:t>
+            </a:r>
+          </a:p>
+        </p:txBody>
+      </p:sp>
+      <p:sp>
+        <p:nvSpPr>
+          <p:cNvPr id="71" name="Oval 70">
+            <a:extLst>
+              <a:ext uri="{FF2B5EF4-FFF2-40B4-BE49-F238E27FC236}">
+                <a16:creationId xmlns:a16="http://schemas.microsoft.com/office/drawing/2014/main" id="{69B0E23B-696C-C748-995A-271AF7445A00}"/>
+              </a:ext>
+            </a:extLst>
+          </p:cNvPr>
+          <p:cNvSpPr/>
+          <p:nvPr/>
+        </p:nvSpPr>
+        <p:spPr>
+          <a:xfrm>
+            <a:off x="2614606" y="2514857"/>
+            <a:ext cx="253435" cy="212902"/>
+          </a:xfrm>
+          <a:prstGeom prst="ellipse">
+            <a:avLst/>
+          </a:prstGeom>
+          <a:solidFill>
+            <a:schemeClr val="tx1"/>
+          </a:solidFill>
+          <a:ln>
+            <a:solidFill>
+              <a:schemeClr val="tx1"/>
+            </a:solidFill>
+          </a:ln>
+        </p:spPr>
+        <p:style>
+          <a:lnRef idx="2">
+            <a:schemeClr val="accent1">
+              <a:shade val="50000"/>
+            </a:schemeClr>
+          </a:lnRef>
+          <a:fillRef idx="1">
+            <a:schemeClr val="accent1"/>
+          </a:fillRef>
+          <a:effectRef idx="0">
+            <a:schemeClr val="accent1"/>
+          </a:effectRef>
+          <a:fontRef idx="minor">
+            <a:schemeClr val="lt1"/>
+          </a:fontRef>
+        </p:style>
+        <p:txBody>
+          <a:bodyPr lIns="0" tIns="0" rIns="0" bIns="0" rtlCol="0" anchor="ctr"/>
+          <a:lstStyle/>
+          <a:p>
+            <a:pPr algn="ctr"/>
+            <a:r>
+              <a:rPr lang="en-US" sz="800" dirty="0">
+                <a:latin typeface="Arial" panose="020B0604020202020204" pitchFamily="34" charset="0"/>
+                <a:cs typeface="Arial" panose="020B0604020202020204" pitchFamily="34" charset="0"/>
+              </a:rPr>
+              <a:t>1.3</a:t>
+            </a:r>
+          </a:p>
+        </p:txBody>
+      </p:sp>
+      <p:sp>
+        <p:nvSpPr>
+          <p:cNvPr id="74" name="Oval 73">
+            <a:extLst>
+              <a:ext uri="{FF2B5EF4-FFF2-40B4-BE49-F238E27FC236}">
+                <a16:creationId xmlns:a16="http://schemas.microsoft.com/office/drawing/2014/main" id="{7644EDD6-4C8D-584B-B31D-1EA23CA2ACC4}"/>
+              </a:ext>
+            </a:extLst>
+          </p:cNvPr>
+          <p:cNvSpPr/>
+          <p:nvPr/>
+        </p:nvSpPr>
+        <p:spPr>
+          <a:xfrm>
+            <a:off x="6524149" y="2605868"/>
+            <a:ext cx="300569" cy="204616"/>
+          </a:xfrm>
+          <a:prstGeom prst="ellipse">
+            <a:avLst/>
+          </a:prstGeom>
+          <a:solidFill>
+            <a:schemeClr val="tx1"/>
+          </a:solidFill>
+          <a:ln>
+            <a:solidFill>
+              <a:schemeClr val="tx1"/>
+            </a:solidFill>
+          </a:ln>
+        </p:spPr>
+        <p:style>
+          <a:lnRef idx="2">
+            <a:schemeClr val="accent1">
+              <a:shade val="50000"/>
+            </a:schemeClr>
+          </a:lnRef>
+          <a:fillRef idx="1">
+            <a:schemeClr val="accent1"/>
+          </a:fillRef>
+          <a:effectRef idx="0">
+            <a:schemeClr val="accent1"/>
+          </a:effectRef>
+          <a:fontRef idx="minor">
+            <a:schemeClr val="lt1"/>
+          </a:fontRef>
+        </p:style>
+        <p:txBody>
+          <a:bodyPr lIns="0" tIns="0" rIns="0" bIns="0" rtlCol="0" anchor="ctr"/>
+          <a:lstStyle/>
+          <a:p>
+            <a:pPr algn="ctr"/>
+            <a:r>
+              <a:rPr lang="en-US" sz="800" dirty="0">
+                <a:latin typeface="Arial" panose="020B0604020202020204" pitchFamily="34" charset="0"/>
+                <a:cs typeface="Arial" panose="020B0604020202020204" pitchFamily="34" charset="0"/>
+              </a:rPr>
+              <a:t>1.10</a:t>
+            </a:r>
+          </a:p>
+        </p:txBody>
+      </p:sp>
+      <p:sp>
+        <p:nvSpPr>
+          <p:cNvPr id="76" name="Rectangle 75">
+            <a:extLst>
+              <a:ext uri="{FF2B5EF4-FFF2-40B4-BE49-F238E27FC236}">
+                <a16:creationId xmlns:a16="http://schemas.microsoft.com/office/drawing/2014/main" id="{43B8301F-E40E-4849-9227-460F5481235C}"/>
+              </a:ext>
+            </a:extLst>
+          </p:cNvPr>
+          <p:cNvSpPr/>
+          <p:nvPr/>
+        </p:nvSpPr>
+        <p:spPr>
+          <a:xfrm>
+            <a:off x="1150007" y="4636968"/>
+            <a:ext cx="6248450" cy="1049233"/>
+          </a:xfrm>
+          <a:prstGeom prst="rect">
+            <a:avLst/>
+          </a:prstGeom>
+          <a:noFill/>
+          <a:ln w="12700">
+            <a:solidFill>
+              <a:schemeClr val="tx1"/>
+            </a:solidFill>
+            <a:prstDash val="dash"/>
+          </a:ln>
+        </p:spPr>
+        <p:style>
+          <a:lnRef idx="2">
+            <a:schemeClr val="accent1">
+              <a:shade val="50000"/>
+            </a:schemeClr>
+          </a:lnRef>
+          <a:fillRef idx="1">
+            <a:schemeClr val="accent1"/>
+          </a:fillRef>
+          <a:effectRef idx="0">
+            <a:schemeClr val="accent1"/>
+          </a:effectRef>
+          <a:fontRef idx="minor">
+            <a:schemeClr val="lt1"/>
+          </a:fontRef>
+        </p:style>
+        <p:txBody>
+          <a:bodyPr rot="0" spcFirstLastPara="0" vertOverflow="overflow" horzOverflow="overflow" vert="horz" wrap="square" lIns="91440" tIns="0" rIns="91440" bIns="45720" numCol="1" spcCol="0" rtlCol="0" fromWordArt="0" anchor="t" anchorCtr="0" forceAA="0" compatLnSpc="1">
+            <a:prstTxWarp prst="textNoShape">
+              <a:avLst/>
+            </a:prstTxWarp>
+            <a:noAutofit/>
+          </a:bodyPr>
+          <a:lstStyle/>
+          <a:p>
+            <a:r>
+              <a:rPr lang="en-US" sz="1200" b="1" dirty="0">
+                <a:solidFill>
+                  <a:schemeClr val="tx1"/>
+                </a:solidFill>
+              </a:rPr>
+              <a:t>Global-region</a:t>
+            </a:r>
+          </a:p>
+        </p:txBody>
+      </p:sp>
+      <p:pic>
+        <p:nvPicPr>
+          <p:cNvPr id="77" name="Graphic 24">
+            <a:extLst>
+              <a:ext uri="{FF2B5EF4-FFF2-40B4-BE49-F238E27FC236}">
+                <a16:creationId xmlns:a16="http://schemas.microsoft.com/office/drawing/2014/main" id="{DFDDD1BF-46C7-1544-AE42-9500B62E3466}"/>
+              </a:ext>
+            </a:extLst>
+          </p:cNvPr>
+          <p:cNvPicPr>
+            <a:picLocks noChangeAspect="1" noChangeArrowheads="1"/>
+          </p:cNvPicPr>
+          <p:nvPr/>
+        </p:nvPicPr>
+        <p:blipFill>
+          <a:blip r:embed="rId14">
+            <a:extLst>
+              <a:ext uri="{28A0092B-C50C-407E-A947-70E740481C1C}">
+                <a14:useLocalDpi xmlns:a14="http://schemas.microsoft.com/office/drawing/2010/main" val="0"/>
+              </a:ext>
+            </a:extLst>
+          </a:blip>
+          <a:srcRect/>
+          <a:stretch>
+            <a:fillRect/>
+          </a:stretch>
+        </p:blipFill>
+        <p:spPr bwMode="auto">
+          <a:xfrm>
+            <a:off x="2815304" y="4793955"/>
+            <a:ext cx="457200" cy="457200"/>
+          </a:xfrm>
+          <a:prstGeom prst="rect">
+            <a:avLst/>
+          </a:prstGeom>
+          <a:noFill/>
+          <a:ln>
+            <a:noFill/>
+          </a:ln>
+          <a:extLst>
+            <a:ext uri="{909E8E84-426E-40DD-AFC4-6F175D3DCCD1}">
+              <a14:hiddenFill xmlns:a14="http://schemas.microsoft.com/office/drawing/2010/main">
+                <a:solidFill>
+                  <a:srgbClr val="FFFFFF"/>
+                </a:solidFill>
+              </a14:hiddenFill>
+            </a:ext>
+            <a:ext uri="{91240B29-F687-4F45-9708-019B960494DF}">
+              <a14:hiddenLine xmlns:a14="http://schemas.microsoft.com/office/drawing/2010/main" w="9525">
+                <a:solidFill>
+                  <a:srgbClr val="000000"/>
+                </a:solidFill>
+                <a:miter lim="800000"/>
+                <a:headEnd/>
+                <a:tailEnd/>
+              </a14:hiddenLine>
+            </a:ext>
+          </a:extLst>
+        </p:spPr>
+      </p:pic>
+      <p:sp>
+        <p:nvSpPr>
+          <p:cNvPr id="78" name="TextBox 26">
+            <a:extLst>
+              <a:ext uri="{FF2B5EF4-FFF2-40B4-BE49-F238E27FC236}">
+                <a16:creationId xmlns:a16="http://schemas.microsoft.com/office/drawing/2014/main" id="{F476ECCF-2913-0F4C-BB0E-48C646C408D9}"/>
+              </a:ext>
+            </a:extLst>
+          </p:cNvPr>
+          <p:cNvSpPr txBox="1">
+            <a:spLocks noChangeArrowheads="1"/>
+          </p:cNvSpPr>
+          <p:nvPr/>
+        </p:nvSpPr>
+        <p:spPr bwMode="auto">
+          <a:xfrm>
+            <a:off x="2477409" y="5198903"/>
+            <a:ext cx="1143852" cy="430887"/>
+          </a:xfrm>
+          <a:prstGeom prst="rect">
+            <a:avLst/>
+          </a:prstGeom>
+          <a:noFill/>
+          <a:ln>
+            <a:noFill/>
+          </a:ln>
+          <a:extLst>
+            <a:ext uri="{909E8E84-426E-40DD-AFC4-6F175D3DCCD1}">
+              <a14:hiddenFill xmlns:a14="http://schemas.microsoft.com/office/drawing/2010/main">
+                <a:solidFill>
+                  <a:srgbClr val="FFFFFF"/>
+                </a:solidFill>
+              </a14:hiddenFill>
+            </a:ext>
+            <a:ext uri="{91240B29-F687-4F45-9708-019B960494DF}">
+              <a14:hiddenLine xmlns:a14="http://schemas.microsoft.com/office/drawing/2010/main" w="9525">
+                <a:solidFill>
+                  <a:srgbClr val="000000"/>
+                </a:solidFill>
+                <a:miter lim="800000"/>
+                <a:headEnd/>
+                <a:tailEnd/>
+              </a14:hiddenLine>
+            </a:ext>
+          </a:extLst>
+        </p:spPr>
+        <p:txBody>
+          <a:bodyPr wrap="square">
+            <a:spAutoFit/>
+          </a:bodyPr>
+          <a:lstStyle>
+            <a:lvl1pPr>
+              <a:defRPr>
+                <a:solidFill>
+                  <a:schemeClr val="tx1"/>
+                </a:solidFill>
+                <a:latin typeface="Calibri" panose="020F0502020204030204" pitchFamily="34" charset="0"/>
+              </a:defRPr>
+            </a:lvl1pPr>
+            <a:lvl2pPr marL="742950" indent="-285750">
+              <a:defRPr>
+                <a:solidFill>
+                  <a:schemeClr val="tx1"/>
+                </a:solidFill>
+                <a:latin typeface="Calibri" panose="020F0502020204030204" pitchFamily="34" charset="0"/>
+              </a:defRPr>
+            </a:lvl2pPr>
+            <a:lvl3pPr marL="1143000" indent="-228600">
+              <a:defRPr>
+                <a:solidFill>
+                  <a:schemeClr val="tx1"/>
+                </a:solidFill>
+                <a:latin typeface="Calibri" panose="020F0502020204030204" pitchFamily="34" charset="0"/>
+              </a:defRPr>
+            </a:lvl3pPr>
+            <a:lvl4pPr marL="1600200" indent="-228600">
+              <a:defRPr>
+                <a:solidFill>
+                  <a:schemeClr val="tx1"/>
+                </a:solidFill>
+                <a:latin typeface="Calibri" panose="020F0502020204030204" pitchFamily="34" charset="0"/>
+              </a:defRPr>
+            </a:lvl4pPr>
+            <a:lvl5pPr marL="2057400" indent="-228600">
+              <a:defRPr>
+                <a:solidFill>
+                  <a:schemeClr val="tx1"/>
+                </a:solidFill>
+                <a:latin typeface="Calibri" panose="020F0502020204030204" pitchFamily="34" charset="0"/>
+              </a:defRPr>
+            </a:lvl5pPr>
+            <a:lvl6pPr marL="2514600" indent="-228600" eaLnBrk="0" fontAlgn="base" hangingPunct="0">
+              <a:spcBef>
+                <a:spcPct val="0"/>
+              </a:spcBef>
+              <a:spcAft>
+                <a:spcPct val="0"/>
+              </a:spcAft>
+              <a:defRPr>
+                <a:solidFill>
+                  <a:schemeClr val="tx1"/>
+                </a:solidFill>
+                <a:latin typeface="Calibri" panose="020F0502020204030204" pitchFamily="34" charset="0"/>
+              </a:defRPr>
+            </a:lvl6pPr>
+            <a:lvl7pPr marL="2971800" indent="-228600" eaLnBrk="0" fontAlgn="base" hangingPunct="0">
+              <a:spcBef>
+                <a:spcPct val="0"/>
+              </a:spcBef>
+              <a:spcAft>
+                <a:spcPct val="0"/>
+              </a:spcAft>
+              <a:defRPr>
+                <a:solidFill>
+                  <a:schemeClr val="tx1"/>
+                </a:solidFill>
+                <a:latin typeface="Calibri" panose="020F0502020204030204" pitchFamily="34" charset="0"/>
+              </a:defRPr>
+            </a:lvl7pPr>
+            <a:lvl8pPr marL="3429000" indent="-228600" eaLnBrk="0" fontAlgn="base" hangingPunct="0">
+              <a:spcBef>
+                <a:spcPct val="0"/>
+              </a:spcBef>
+              <a:spcAft>
+                <a:spcPct val="0"/>
+              </a:spcAft>
+              <a:defRPr>
+                <a:solidFill>
+                  <a:schemeClr val="tx1"/>
+                </a:solidFill>
+                <a:latin typeface="Calibri" panose="020F0502020204030204" pitchFamily="34" charset="0"/>
+              </a:defRPr>
+            </a:lvl8pPr>
+            <a:lvl9pPr marL="3886200" indent="-228600" eaLnBrk="0" fontAlgn="base" hangingPunct="0">
+              <a:spcBef>
+                <a:spcPct val="0"/>
+              </a:spcBef>
+              <a:spcAft>
+                <a:spcPct val="0"/>
+              </a:spcAft>
+              <a:defRPr>
+                <a:solidFill>
+                  <a:schemeClr val="tx1"/>
+                </a:solidFill>
+                <a:latin typeface="Calibri" panose="020F0502020204030204" pitchFamily="34" charset="0"/>
+              </a:defRPr>
+            </a:lvl9pPr>
+          </a:lstStyle>
+          <a:p>
+            <a:pPr algn="ctr" eaLnBrk="1" hangingPunct="1"/>
+            <a:r>
+              <a:rPr lang="en-US" altLang="en-US" sz="1100" dirty="0">
+                <a:latin typeface="Arial" panose="020B0604020202020204" pitchFamily="34" charset="0"/>
+                <a:ea typeface="Amazon Ember" panose="020B0603020204020204" pitchFamily="34" charset="0"/>
+                <a:cs typeface="Arial" panose="020B0604020202020204" pitchFamily="34" charset="0"/>
+              </a:rPr>
+              <a:t>Global Event Rules</a:t>
+            </a:r>
+          </a:p>
+        </p:txBody>
+      </p:sp>
+      <p:sp>
+        <p:nvSpPr>
+          <p:cNvPr id="79" name="Oval 78">
+            <a:extLst>
+              <a:ext uri="{FF2B5EF4-FFF2-40B4-BE49-F238E27FC236}">
+                <a16:creationId xmlns:a16="http://schemas.microsoft.com/office/drawing/2014/main" id="{88FB5C37-5246-6E4E-800B-A26E1490A211}"/>
+              </a:ext>
+            </a:extLst>
+          </p:cNvPr>
+          <p:cNvSpPr/>
+          <p:nvPr/>
+        </p:nvSpPr>
+        <p:spPr>
+          <a:xfrm>
+            <a:off x="2639642" y="4682358"/>
+            <a:ext cx="253435" cy="212902"/>
+          </a:xfrm>
+          <a:prstGeom prst="ellipse">
+            <a:avLst/>
+          </a:prstGeom>
+          <a:solidFill>
+            <a:schemeClr val="tx1"/>
+          </a:solidFill>
+          <a:ln>
+            <a:solidFill>
+              <a:schemeClr val="tx1"/>
+            </a:solidFill>
+          </a:ln>
+        </p:spPr>
+        <p:style>
+          <a:lnRef idx="2">
+            <a:schemeClr val="accent1">
+              <a:shade val="50000"/>
+            </a:schemeClr>
+          </a:lnRef>
+          <a:fillRef idx="1">
+            <a:schemeClr val="accent1"/>
+          </a:fillRef>
+          <a:effectRef idx="0">
+            <a:schemeClr val="accent1"/>
+          </a:effectRef>
+          <a:fontRef idx="minor">
+            <a:schemeClr val="lt1"/>
+          </a:fontRef>
+        </p:style>
+        <p:txBody>
+          <a:bodyPr lIns="0" tIns="0" rIns="0" bIns="0" rtlCol="0" anchor="ctr"/>
+          <a:lstStyle/>
+          <a:p>
+            <a:pPr algn="ctr"/>
+            <a:r>
+              <a:rPr lang="en-US" sz="800" dirty="0">
+                <a:latin typeface="Arial" panose="020B0604020202020204" pitchFamily="34" charset="0"/>
+                <a:cs typeface="Arial" panose="020B0604020202020204" pitchFamily="34" charset="0"/>
+              </a:rPr>
+              <a:t>1.4</a:t>
+            </a:r>
+          </a:p>
+        </p:txBody>
+      </p:sp>
+      <p:sp>
+        <p:nvSpPr>
+          <p:cNvPr id="73" name="Oval 72">
+            <a:extLst>
+              <a:ext uri="{FF2B5EF4-FFF2-40B4-BE49-F238E27FC236}">
+                <a16:creationId xmlns:a16="http://schemas.microsoft.com/office/drawing/2014/main" id="{E6FDDE61-60C8-D44A-8502-4551714EB701}"/>
+              </a:ext>
+            </a:extLst>
+          </p:cNvPr>
+          <p:cNvSpPr/>
+          <p:nvPr/>
+        </p:nvSpPr>
+        <p:spPr>
+          <a:xfrm>
+            <a:off x="4490537" y="2478553"/>
+            <a:ext cx="253435" cy="212902"/>
+          </a:xfrm>
+          <a:prstGeom prst="ellipse">
+            <a:avLst/>
+          </a:prstGeom>
+          <a:solidFill>
+            <a:schemeClr val="tx1"/>
+          </a:solidFill>
+          <a:ln>
+            <a:solidFill>
+              <a:schemeClr val="tx1"/>
+            </a:solidFill>
+          </a:ln>
+        </p:spPr>
+        <p:style>
+          <a:lnRef idx="2">
+            <a:schemeClr val="accent1">
+              <a:shade val="50000"/>
+            </a:schemeClr>
+          </a:lnRef>
+          <a:fillRef idx="1">
+            <a:schemeClr val="accent1"/>
+          </a:fillRef>
+          <a:effectRef idx="0">
+            <a:schemeClr val="accent1"/>
+          </a:effectRef>
+          <a:fontRef idx="minor">
+            <a:schemeClr val="lt1"/>
+          </a:fontRef>
+        </p:style>
+        <p:txBody>
+          <a:bodyPr lIns="0" tIns="0" rIns="0" bIns="0" rtlCol="0" anchor="ctr"/>
+          <a:lstStyle/>
+          <a:p>
+            <a:pPr algn="ctr"/>
+            <a:r>
+              <a:rPr lang="en-US" sz="800" dirty="0">
+                <a:latin typeface="Arial" panose="020B0604020202020204" pitchFamily="34" charset="0"/>
+                <a:cs typeface="Arial" panose="020B0604020202020204" pitchFamily="34" charset="0"/>
+              </a:rPr>
+              <a:t>1.6</a:t>
+            </a:r>
+          </a:p>
+        </p:txBody>
+      </p:sp>
+      <p:sp>
+        <p:nvSpPr>
+          <p:cNvPr id="85" name="Oval 84">
+            <a:extLst>
+              <a:ext uri="{FF2B5EF4-FFF2-40B4-BE49-F238E27FC236}">
+                <a16:creationId xmlns:a16="http://schemas.microsoft.com/office/drawing/2014/main" id="{CEFCECBE-6ABC-B947-B401-C09A113E26B9}"/>
+              </a:ext>
+            </a:extLst>
+          </p:cNvPr>
+          <p:cNvSpPr/>
+          <p:nvPr/>
+        </p:nvSpPr>
+        <p:spPr>
+          <a:xfrm>
+            <a:off x="4490537" y="3590607"/>
+            <a:ext cx="253435" cy="212902"/>
+          </a:xfrm>
+          <a:prstGeom prst="ellipse">
+            <a:avLst/>
+          </a:prstGeom>
+          <a:solidFill>
+            <a:schemeClr val="tx1"/>
+          </a:solidFill>
+          <a:ln>
+            <a:solidFill>
+              <a:schemeClr val="tx1"/>
+            </a:solidFill>
+          </a:ln>
+        </p:spPr>
+        <p:style>
+          <a:lnRef idx="2">
+            <a:schemeClr val="accent1">
+              <a:shade val="50000"/>
+            </a:schemeClr>
+          </a:lnRef>
+          <a:fillRef idx="1">
+            <a:schemeClr val="accent1"/>
+          </a:fillRef>
+          <a:effectRef idx="0">
+            <a:schemeClr val="accent1"/>
+          </a:effectRef>
+          <a:fontRef idx="minor">
+            <a:schemeClr val="lt1"/>
+          </a:fontRef>
+        </p:style>
+        <p:txBody>
+          <a:bodyPr lIns="0" tIns="0" rIns="0" bIns="0" rtlCol="0" anchor="ctr"/>
+          <a:lstStyle/>
+          <a:p>
+            <a:pPr algn="ctr"/>
+            <a:r>
+              <a:rPr lang="en-US" sz="800" dirty="0">
+                <a:latin typeface="Arial" panose="020B0604020202020204" pitchFamily="34" charset="0"/>
+                <a:cs typeface="Arial" panose="020B0604020202020204" pitchFamily="34" charset="0"/>
+              </a:rPr>
+              <a:t>1.7</a:t>
+            </a:r>
+          </a:p>
+        </p:txBody>
+      </p:sp>
+      <p:sp>
+        <p:nvSpPr>
+          <p:cNvPr id="86" name="Oval 85">
+            <a:extLst>
+              <a:ext uri="{FF2B5EF4-FFF2-40B4-BE49-F238E27FC236}">
+                <a16:creationId xmlns:a16="http://schemas.microsoft.com/office/drawing/2014/main" id="{4789B753-017F-C844-9F05-756433E2C1F0}"/>
+              </a:ext>
+            </a:extLst>
+          </p:cNvPr>
+          <p:cNvSpPr/>
+          <p:nvPr/>
+        </p:nvSpPr>
+        <p:spPr>
+          <a:xfrm>
+            <a:off x="5927512" y="1388382"/>
+            <a:ext cx="253435" cy="212902"/>
+          </a:xfrm>
+          <a:prstGeom prst="ellipse">
+            <a:avLst/>
+          </a:prstGeom>
+          <a:solidFill>
+            <a:schemeClr val="tx1"/>
+          </a:solidFill>
+          <a:ln>
+            <a:solidFill>
+              <a:schemeClr val="tx1"/>
+            </a:solidFill>
+          </a:ln>
+        </p:spPr>
+        <p:style>
+          <a:lnRef idx="2">
+            <a:schemeClr val="accent1">
+              <a:shade val="50000"/>
+            </a:schemeClr>
+          </a:lnRef>
+          <a:fillRef idx="1">
+            <a:schemeClr val="accent1"/>
+          </a:fillRef>
+          <a:effectRef idx="0">
+            <a:schemeClr val="accent1"/>
+          </a:effectRef>
+          <a:fontRef idx="minor">
+            <a:schemeClr val="lt1"/>
+          </a:fontRef>
+        </p:style>
+        <p:txBody>
+          <a:bodyPr lIns="0" tIns="0" rIns="0" bIns="0" rtlCol="0" anchor="ctr"/>
+          <a:lstStyle/>
+          <a:p>
+            <a:pPr algn="ctr"/>
+            <a:r>
+              <a:rPr lang="en-US" sz="800" dirty="0">
+                <a:latin typeface="Arial" panose="020B0604020202020204" pitchFamily="34" charset="0"/>
+                <a:cs typeface="Arial" panose="020B0604020202020204" pitchFamily="34" charset="0"/>
+              </a:rPr>
+              <a:t>1.8</a:t>
+            </a:r>
+          </a:p>
+        </p:txBody>
+      </p:sp>
+      <p:sp>
+        <p:nvSpPr>
+          <p:cNvPr id="99" name="Oval 98">
+            <a:extLst>
+              <a:ext uri="{FF2B5EF4-FFF2-40B4-BE49-F238E27FC236}">
+                <a16:creationId xmlns:a16="http://schemas.microsoft.com/office/drawing/2014/main" id="{921BF5EB-3BA8-A644-BD94-C9F4ABF03C80}"/>
+              </a:ext>
+            </a:extLst>
+          </p:cNvPr>
+          <p:cNvSpPr/>
+          <p:nvPr/>
+        </p:nvSpPr>
+        <p:spPr>
+          <a:xfrm>
+            <a:off x="5934600" y="3783529"/>
+            <a:ext cx="253435" cy="212902"/>
+          </a:xfrm>
+          <a:prstGeom prst="ellipse">
+            <a:avLst/>
+          </a:prstGeom>
+          <a:solidFill>
+            <a:schemeClr val="tx1"/>
+          </a:solidFill>
+          <a:ln>
+            <a:solidFill>
+              <a:schemeClr val="tx1"/>
+            </a:solidFill>
+          </a:ln>
+        </p:spPr>
+        <p:style>
+          <a:lnRef idx="2">
+            <a:schemeClr val="accent1">
+              <a:shade val="50000"/>
+            </a:schemeClr>
+          </a:lnRef>
+          <a:fillRef idx="1">
+            <a:schemeClr val="accent1"/>
+          </a:fillRef>
+          <a:effectRef idx="0">
+            <a:schemeClr val="accent1"/>
+          </a:effectRef>
+          <a:fontRef idx="minor">
+            <a:schemeClr val="lt1"/>
+          </a:fontRef>
+        </p:style>
+        <p:txBody>
+          <a:bodyPr lIns="0" tIns="0" rIns="0" bIns="0" rtlCol="0" anchor="ctr"/>
+          <a:lstStyle/>
+          <a:p>
+            <a:pPr algn="ctr"/>
+            <a:r>
+              <a:rPr lang="en-US" sz="800" dirty="0">
+                <a:latin typeface="Arial" panose="020B0604020202020204" pitchFamily="34" charset="0"/>
+                <a:cs typeface="Arial" panose="020B0604020202020204" pitchFamily="34" charset="0"/>
+              </a:rPr>
+              <a:t>1.9</a:t>
+            </a:r>
+          </a:p>
+        </p:txBody>
+      </p:sp>
+      <p:cxnSp>
+        <p:nvCxnSpPr>
+          <p:cNvPr id="100" name="Straight Arrow Connector 99">
+            <a:extLst>
+              <a:ext uri="{FF2B5EF4-FFF2-40B4-BE49-F238E27FC236}">
+                <a16:creationId xmlns:a16="http://schemas.microsoft.com/office/drawing/2014/main" id="{7CB10BD3-823E-9349-BB03-FA87C58971DA}"/>
+              </a:ext>
+            </a:extLst>
+          </p:cNvPr>
+          <p:cNvCxnSpPr>
+            <a:cxnSpLocks/>
+          </p:cNvCxnSpPr>
+          <p:nvPr/>
+        </p:nvCxnSpPr>
+        <p:spPr>
+          <a:xfrm>
+            <a:off x="3475726" y="2803474"/>
+            <a:ext cx="1014811" cy="0"/>
+          </a:xfrm>
+          <a:prstGeom prst="straightConnector1">
+            <a:avLst/>
+          </a:prstGeom>
+          <a:ln>
+            <a:tailEnd type="triangle"/>
+          </a:ln>
+        </p:spPr>
+        <p:style>
+          <a:lnRef idx="1">
+            <a:schemeClr val="dk1"/>
+          </a:lnRef>
+          <a:fillRef idx="0">
+            <a:schemeClr val="dk1"/>
+          </a:fillRef>
+          <a:effectRef idx="0">
+            <a:schemeClr val="dk1"/>
+          </a:effectRef>
+          <a:fontRef idx="minor">
+            <a:schemeClr val="tx1"/>
+          </a:fontRef>
+        </p:style>
+      </p:cxnSp>
+    </p:spTree>
+    <p:extLst>
+      <p:ext uri="{BB962C8B-B14F-4D97-AF65-F5344CB8AC3E}">
+        <p14:creationId xmlns:p14="http://schemas.microsoft.com/office/powerpoint/2010/main" val="242955844"/>
       </p:ext>
     </p:extLst>
   </p:cSld>

</xml_diff>